<commit_message>
Update to Box plot
</commit_message>
<xml_diff>
--- a/Dfordata_eda_powerpoint.pptx
+++ b/Dfordata_eda_powerpoint.pptx
@@ -19,28 +19,29 @@
     <p:sldId id="289" r:id="rId13"/>
     <p:sldId id="290" r:id="rId14"/>
     <p:sldId id="292" r:id="rId15"/>
-    <p:sldId id="264" r:id="rId16"/>
-    <p:sldId id="265" r:id="rId17"/>
-    <p:sldId id="266" r:id="rId18"/>
-    <p:sldId id="267" r:id="rId19"/>
-    <p:sldId id="268" r:id="rId20"/>
-    <p:sldId id="269" r:id="rId21"/>
-    <p:sldId id="270" r:id="rId22"/>
-    <p:sldId id="271" r:id="rId23"/>
-    <p:sldId id="272" r:id="rId24"/>
-    <p:sldId id="273" r:id="rId25"/>
-    <p:sldId id="274" r:id="rId26"/>
-    <p:sldId id="275" r:id="rId27"/>
-    <p:sldId id="276" r:id="rId28"/>
-    <p:sldId id="277" r:id="rId29"/>
-    <p:sldId id="278" r:id="rId30"/>
-    <p:sldId id="279" r:id="rId31"/>
-    <p:sldId id="280" r:id="rId32"/>
-    <p:sldId id="281" r:id="rId33"/>
-    <p:sldId id="282" r:id="rId34"/>
-    <p:sldId id="283" r:id="rId35"/>
-    <p:sldId id="284" r:id="rId36"/>
-    <p:sldId id="285" r:id="rId37"/>
+    <p:sldId id="293" r:id="rId16"/>
+    <p:sldId id="264" r:id="rId17"/>
+    <p:sldId id="265" r:id="rId18"/>
+    <p:sldId id="266" r:id="rId19"/>
+    <p:sldId id="267" r:id="rId20"/>
+    <p:sldId id="268" r:id="rId21"/>
+    <p:sldId id="269" r:id="rId22"/>
+    <p:sldId id="270" r:id="rId23"/>
+    <p:sldId id="271" r:id="rId24"/>
+    <p:sldId id="272" r:id="rId25"/>
+    <p:sldId id="273" r:id="rId26"/>
+    <p:sldId id="274" r:id="rId27"/>
+    <p:sldId id="275" r:id="rId28"/>
+    <p:sldId id="276" r:id="rId29"/>
+    <p:sldId id="277" r:id="rId30"/>
+    <p:sldId id="278" r:id="rId31"/>
+    <p:sldId id="279" r:id="rId32"/>
+    <p:sldId id="280" r:id="rId33"/>
+    <p:sldId id="281" r:id="rId34"/>
+    <p:sldId id="282" r:id="rId35"/>
+    <p:sldId id="283" r:id="rId36"/>
+    <p:sldId id="284" r:id="rId37"/>
+    <p:sldId id="285" r:id="rId38"/>
   </p:sldIdLst>
   <p:sldSz cx="9144000" cy="5143500" type="screen16x9"/>
   <p:notesSz cx="9144000" cy="5143500"/>
@@ -2826,55 +2827,6 @@
           <a:chExt cx="0" cy="0"/>
         </a:xfrm>
       </p:grpSpPr>
-      <p:pic>
-        <p:nvPicPr>
-          <p:cNvPr id="1026" name="Picture 2" descr="Bar Graph - Learn About Bar Charts and Bar Diagrams">
-            <a:extLst>
-              <a:ext uri="{FF2B5EF4-FFF2-40B4-BE49-F238E27FC236}">
-                <a16:creationId xmlns:a16="http://schemas.microsoft.com/office/drawing/2014/main" id="{323A4D97-B1D0-4101-A4BD-D808D27A21D7}"/>
-              </a:ext>
-            </a:extLst>
-          </p:cNvPr>
-          <p:cNvPicPr>
-            <a:picLocks noChangeAspect="1" noChangeArrowheads="1"/>
-          </p:cNvPicPr>
-          <p:nvPr/>
-        </p:nvPicPr>
-        <p:blipFill rotWithShape="1">
-          <a:blip r:embed="rId2" cstate="print">
-            <a:extLst>
-              <a:ext uri="{28A0092B-C50C-407E-A947-70E740481C1C}">
-                <a14:useLocalDpi xmlns:a14="http://schemas.microsoft.com/office/drawing/2010/main" val="0"/>
-              </a:ext>
-            </a:extLst>
-          </a:blip>
-          <a:srcRect l="5942" t="7189" r="6407" b="9229"/>
-          <a:stretch/>
-        </p:blipFill>
-        <p:spPr bwMode="auto">
-          <a:xfrm>
-            <a:off x="5458248" y="1733550"/>
-            <a:ext cx="3289610" cy="2286000"/>
-          </a:xfrm>
-          <a:prstGeom prst="roundRect">
-            <a:avLst>
-              <a:gd name="adj" fmla="val 8594"/>
-            </a:avLst>
-          </a:prstGeom>
-          <a:solidFill>
-            <a:srgbClr val="FFFFFF">
-              <a:shade val="85000"/>
-            </a:srgbClr>
-          </a:solidFill>
-          <a:ln>
-            <a:noFill/>
-          </a:ln>
-          <a:effectLst>
-            <a:reflection blurRad="12700" stA="38000" endPos="28000" dist="5000" dir="5400000" sy="-100000" algn="bl" rotWithShape="0"/>
-          </a:effectLst>
-          <a:extLst/>
-        </p:spPr>
-      </p:pic>
       <p:sp>
         <p:nvSpPr>
           <p:cNvPr id="4" name="TextBox 3">
@@ -2932,7 +2884,7 @@
         <p:spPr>
           <a:xfrm>
             <a:off x="609600" y="895350"/>
-            <a:ext cx="4495800" cy="1900777"/>
+            <a:ext cx="4495800" cy="3373359"/>
           </a:xfrm>
           <a:prstGeom prst="rect">
             <a:avLst/>
@@ -2953,91 +2905,115 @@
               <a:buChar char="Ø"/>
             </a:pPr>
             <a:r>
-              <a:rPr lang="en-US" sz="1600" b="1" spc="-5" dirty="0"/>
-              <a:t> A bar </a:t>
-            </a:r>
-            <a:r>
-              <a:rPr lang="en-US" sz="1600" spc="-5" dirty="0"/>
-              <a:t>chart provides a way of showing data values represented as vertical bars/horizontal bars. It is sometimes used to show trend data, and the comparison of multiple data sets side by side.</a:t>
-            </a:r>
+              <a:rPr lang="en-US" dirty="0"/>
+              <a:t>A </a:t>
+            </a:r>
+            <a:r>
+              <a:rPr lang="en-US" b="1" dirty="0"/>
+              <a:t>scatter plot </a:t>
+            </a:r>
+            <a:r>
+              <a:rPr lang="en-US" dirty="0"/>
+              <a:t>is a graphical representation of data visualization in which it shows the relationship between different variables. </a:t>
+            </a:r>
+          </a:p>
+          <a:p>
+            <a:pPr marL="285750" indent="-285750">
+              <a:lnSpc>
+                <a:spcPct val="150000"/>
+              </a:lnSpc>
+              <a:buFont typeface="Wingdings" panose="05000000000000000000" pitchFamily="2" charset="2"/>
+              <a:buChar char="Ø"/>
+            </a:pPr>
+            <a:r>
+              <a:rPr lang="en-US" dirty="0"/>
+              <a:t>A scatter plot used dots to represent </a:t>
+            </a:r>
+            <a:r>
+              <a:rPr lang="en-US" b="1" dirty="0"/>
+              <a:t> </a:t>
+            </a:r>
+            <a:r>
+              <a:rPr lang="en-US" dirty="0"/>
+              <a:t>values for two different numeric variables.</a:t>
+            </a:r>
+          </a:p>
+          <a:p>
+            <a:pPr marL="285750" indent="-285750">
+              <a:lnSpc>
+                <a:spcPct val="150000"/>
+              </a:lnSpc>
+              <a:buFont typeface="Wingdings" panose="05000000000000000000" pitchFamily="2" charset="2"/>
+              <a:buChar char="Ø"/>
+            </a:pPr>
+            <a:r>
+              <a:rPr lang="en-US" dirty="0"/>
+              <a:t>The position of each dot on the horizontal and vertical axis indicates values for an individual data point.</a:t>
+            </a:r>
+            <a:endParaRPr lang="en-US" sz="1600" spc="-5" dirty="0"/>
           </a:p>
         </p:txBody>
       </p:sp>
-      <p:sp>
-        <p:nvSpPr>
-          <p:cNvPr id="8" name="TextBox 7">
+      <p:pic>
+        <p:nvPicPr>
+          <p:cNvPr id="2" name="Picture 1">
             <a:extLst>
               <a:ext uri="{FF2B5EF4-FFF2-40B4-BE49-F238E27FC236}">
-                <a16:creationId xmlns:a16="http://schemas.microsoft.com/office/drawing/2014/main" id="{62F39E80-ED4F-4133-9EB7-6EACFA2664D0}"/>
+                <a16:creationId xmlns:a16="http://schemas.microsoft.com/office/drawing/2014/main" id="{87A0B08E-6B02-4896-9FDB-DE91AE4A40B7}"/>
               </a:ext>
             </a:extLst>
           </p:cNvPr>
-          <p:cNvSpPr txBox="1"/>
+          <p:cNvPicPr>
+            <a:picLocks noChangeAspect="1"/>
+          </p:cNvPicPr>
           <p:nvPr/>
-        </p:nvSpPr>
+        </p:nvPicPr>
+        <p:blipFill>
+          <a:blip r:embed="rId2"/>
+          <a:stretch>
+            <a:fillRect/>
+          </a:stretch>
+        </p:blipFill>
         <p:spPr>
           <a:xfrm>
-            <a:off x="609600" y="2975580"/>
-            <a:ext cx="4800600" cy="1839221"/>
+            <a:off x="4953000" y="2796127"/>
+            <a:ext cx="2662238" cy="2289232"/>
           </a:xfrm>
           <a:prstGeom prst="rect">
             <a:avLst/>
           </a:prstGeom>
-          <a:noFill/>
         </p:spPr>
-        <p:txBody>
-          <a:bodyPr wrap="square" rtlCol="0">
-            <a:spAutoFit/>
-          </a:bodyPr>
-          <a:lstStyle/>
-          <a:p>
-            <a:pPr marL="285750" indent="-285750">
-              <a:buFont typeface="Wingdings" panose="05000000000000000000" pitchFamily="2" charset="2"/>
-              <a:buChar char="q"/>
-            </a:pPr>
-            <a:r>
-              <a:rPr lang="en-US" i="1" u="sng" spc="-5" dirty="0"/>
-              <a:t>Bar chart </a:t>
-            </a:r>
-            <a:r>
-              <a:rPr lang="en-US" b="1" i="1" u="sng" spc="-5" dirty="0"/>
-              <a:t>vs</a:t>
-            </a:r>
-            <a:r>
-              <a:rPr lang="en-US" i="1" u="sng" spc="-5" dirty="0"/>
-              <a:t> Histogram</a:t>
-            </a:r>
-            <a:endParaRPr lang="en-US" sz="200" b="1" i="1" spc="-5" dirty="0"/>
-          </a:p>
-          <a:p>
-            <a:pPr marL="288925">
-              <a:lnSpc>
-                <a:spcPct val="150000"/>
-              </a:lnSpc>
-            </a:pPr>
-            <a:r>
-              <a:rPr lang="en-US" sz="1600" spc="-5" dirty="0"/>
-              <a:t>Unlike </a:t>
-            </a:r>
-            <a:r>
-              <a:rPr lang="en-US" sz="1600" b="1" spc="-5" dirty="0"/>
-              <a:t>histograms</a:t>
-            </a:r>
-            <a:r>
-              <a:rPr lang="en-US" sz="1600" spc="-5" dirty="0"/>
-              <a:t>, the </a:t>
-            </a:r>
-            <a:r>
-              <a:rPr lang="en-US" sz="1600" b="1" spc="-5" dirty="0"/>
-              <a:t>bars</a:t>
-            </a:r>
-            <a:r>
-              <a:rPr lang="en-US" sz="1600" spc="-5" dirty="0"/>
-              <a:t> in bar charts have                        spaces between them to emphasize that each bar represents a discrete value, whereas histograms are for continuous data.</a:t>
-            </a:r>
-          </a:p>
-        </p:txBody>
-      </p:sp>
+      </p:pic>
+      <p:pic>
+        <p:nvPicPr>
+          <p:cNvPr id="3" name="Picture 2">
+            <a:extLst>
+              <a:ext uri="{FF2B5EF4-FFF2-40B4-BE49-F238E27FC236}">
+                <a16:creationId xmlns:a16="http://schemas.microsoft.com/office/drawing/2014/main" id="{EC87C636-2E6C-48C3-B9D1-866C48D67377}"/>
+              </a:ext>
+            </a:extLst>
+          </p:cNvPr>
+          <p:cNvPicPr>
+            <a:picLocks noChangeAspect="1"/>
+          </p:cNvPicPr>
+          <p:nvPr/>
+        </p:nvPicPr>
+        <p:blipFill>
+          <a:blip r:embed="rId3"/>
+          <a:stretch>
+            <a:fillRect/>
+          </a:stretch>
+        </p:blipFill>
+        <p:spPr>
+          <a:xfrm>
+            <a:off x="6324600" y="561374"/>
+            <a:ext cx="2662238" cy="2190750"/>
+          </a:xfrm>
+          <a:prstGeom prst="rect">
+            <a:avLst/>
+          </a:prstGeom>
+        </p:spPr>
+      </p:pic>
     </p:spTree>
     <p:extLst>
       <p:ext uri="{BB962C8B-B14F-4D97-AF65-F5344CB8AC3E}">
@@ -3052,6 +3028,232 @@
 </file>
 
 <file path=ppt/slides/slide15.xml><?xml version="1.0" encoding="utf-8"?>
+<p:sld xmlns:a="http://schemas.openxmlformats.org/drawingml/2006/main" xmlns:r="http://schemas.openxmlformats.org/officeDocument/2006/relationships" xmlns:p="http://schemas.openxmlformats.org/presentationml/2006/main">
+  <p:cSld>
+    <p:spTree>
+      <p:nvGrpSpPr>
+        <p:cNvPr id="1" name=""/>
+        <p:cNvGrpSpPr/>
+        <p:nvPr/>
+      </p:nvGrpSpPr>
+      <p:grpSpPr>
+        <a:xfrm>
+          <a:off x="0" y="0"/>
+          <a:ext cx="0" cy="0"/>
+          <a:chOff x="0" y="0"/>
+          <a:chExt cx="0" cy="0"/>
+        </a:xfrm>
+      </p:grpSpPr>
+      <p:sp>
+        <p:nvSpPr>
+          <p:cNvPr id="4" name="TextBox 3">
+            <a:extLst>
+              <a:ext uri="{FF2B5EF4-FFF2-40B4-BE49-F238E27FC236}">
+                <a16:creationId xmlns:a16="http://schemas.microsoft.com/office/drawing/2014/main" id="{EC991184-1F80-4B4C-8716-ECD6C1C8086E}"/>
+              </a:ext>
+            </a:extLst>
+          </p:cNvPr>
+          <p:cNvSpPr txBox="1"/>
+          <p:nvPr/>
+        </p:nvSpPr>
+        <p:spPr>
+          <a:xfrm>
+            <a:off x="609600" y="285750"/>
+            <a:ext cx="5867400" cy="477054"/>
+          </a:xfrm>
+          <a:prstGeom prst="rect">
+            <a:avLst/>
+          </a:prstGeom>
+          <a:noFill/>
+        </p:spPr>
+        <p:txBody>
+          <a:bodyPr wrap="square" rtlCol="0">
+            <a:spAutoFit/>
+          </a:bodyPr>
+          <a:lstStyle/>
+          <a:p>
+            <a:r>
+              <a:rPr lang="en-US" sz="2500" b="1" spc="-5" dirty="0">
+                <a:solidFill>
+                  <a:srgbClr val="CC0000"/>
+                </a:solidFill>
+                <a:latin typeface="Arial"/>
+                <a:ea typeface="+mj-ea"/>
+                <a:cs typeface="Arial"/>
+              </a:rPr>
+              <a:t>Box plot</a:t>
+            </a:r>
+          </a:p>
+        </p:txBody>
+      </p:sp>
+      <p:sp>
+        <p:nvSpPr>
+          <p:cNvPr id="5" name="TextBox 4">
+            <a:extLst>
+              <a:ext uri="{FF2B5EF4-FFF2-40B4-BE49-F238E27FC236}">
+                <a16:creationId xmlns:a16="http://schemas.microsoft.com/office/drawing/2014/main" id="{06AB3E3D-23C8-4874-B551-5ACBB8C36E00}"/>
+              </a:ext>
+            </a:extLst>
+          </p:cNvPr>
+          <p:cNvSpPr txBox="1"/>
+          <p:nvPr/>
+        </p:nvSpPr>
+        <p:spPr>
+          <a:xfrm>
+            <a:off x="609600" y="666750"/>
+            <a:ext cx="4495800" cy="4202497"/>
+          </a:xfrm>
+          <a:prstGeom prst="rect">
+            <a:avLst/>
+          </a:prstGeom>
+          <a:noFill/>
+        </p:spPr>
+        <p:txBody>
+          <a:bodyPr wrap="square" rtlCol="0">
+            <a:spAutoFit/>
+          </a:bodyPr>
+          <a:lstStyle/>
+          <a:p>
+            <a:pPr marL="285750" indent="-285750">
+              <a:lnSpc>
+                <a:spcPct val="150000"/>
+              </a:lnSpc>
+              <a:buFont typeface="Wingdings" panose="05000000000000000000" pitchFamily="2" charset="2"/>
+              <a:buChar char="Ø"/>
+            </a:pPr>
+            <a:r>
+              <a:rPr lang="en-US" b="1" dirty="0"/>
+              <a:t>A box </a:t>
+            </a:r>
+            <a:r>
+              <a:rPr lang="en-US" dirty="0"/>
+              <a:t>plot also know as box and whisker plot is a summary of five point data. </a:t>
+            </a:r>
+          </a:p>
+          <a:p>
+            <a:pPr marL="285750" indent="-285750">
+              <a:lnSpc>
+                <a:spcPct val="150000"/>
+              </a:lnSpc>
+              <a:buFont typeface="Wingdings" panose="05000000000000000000" pitchFamily="2" charset="2"/>
+              <a:buChar char="Ø"/>
+            </a:pPr>
+            <a:r>
+              <a:rPr lang="en-US" dirty="0"/>
+              <a:t>These five-number summary are the minimum, first quartile, median, third quartile, and maximum. </a:t>
+            </a:r>
+          </a:p>
+          <a:p>
+            <a:pPr marL="285750" indent="-285750">
+              <a:lnSpc>
+                <a:spcPct val="150000"/>
+              </a:lnSpc>
+              <a:buFont typeface="Wingdings" panose="05000000000000000000" pitchFamily="2" charset="2"/>
+              <a:buChar char="Ø"/>
+            </a:pPr>
+            <a:r>
+              <a:rPr lang="en-US" dirty="0"/>
+              <a:t>In a box plot, we draw a box from the first quartile to the third quartile. A vertical line goes through the box at the median. The whiskers go from each quartile to the minimum or maximum.</a:t>
+            </a:r>
+          </a:p>
+        </p:txBody>
+      </p:sp>
+      <p:pic>
+        <p:nvPicPr>
+          <p:cNvPr id="1026" name="Picture 2" descr="Box Plot">
+            <a:extLst>
+              <a:ext uri="{FF2B5EF4-FFF2-40B4-BE49-F238E27FC236}">
+                <a16:creationId xmlns:a16="http://schemas.microsoft.com/office/drawing/2014/main" id="{CA3AF884-8682-4CE9-B685-D2E383D6E3A5}"/>
+              </a:ext>
+            </a:extLst>
+          </p:cNvPr>
+          <p:cNvPicPr>
+            <a:picLocks noChangeAspect="1" noChangeArrowheads="1"/>
+          </p:cNvPicPr>
+          <p:nvPr/>
+        </p:nvPicPr>
+        <p:blipFill>
+          <a:blip r:embed="rId2" cstate="print">
+            <a:extLst>
+              <a:ext uri="{28A0092B-C50C-407E-A947-70E740481C1C}">
+                <a14:useLocalDpi xmlns:a14="http://schemas.microsoft.com/office/drawing/2010/main" val="0"/>
+              </a:ext>
+            </a:extLst>
+          </a:blip>
+          <a:srcRect/>
+          <a:stretch>
+            <a:fillRect/>
+          </a:stretch>
+        </p:blipFill>
+        <p:spPr bwMode="auto">
+          <a:xfrm>
+            <a:off x="5935891" y="132958"/>
+            <a:ext cx="1993834" cy="2504322"/>
+          </a:xfrm>
+          <a:prstGeom prst="roundRect">
+            <a:avLst>
+              <a:gd name="adj" fmla="val 17718"/>
+            </a:avLst>
+          </a:prstGeom>
+          <a:noFill/>
+          <a:extLst>
+            <a:ext uri="{909E8E84-426E-40DD-AFC4-6F175D3DCCD1}">
+              <a14:hiddenFill xmlns:a14="http://schemas.microsoft.com/office/drawing/2010/main">
+                <a:solidFill>
+                  <a:srgbClr val="FFFFFF"/>
+                </a:solidFill>
+              </a14:hiddenFill>
+            </a:ext>
+          </a:extLst>
+        </p:spPr>
+      </p:pic>
+      <p:pic>
+        <p:nvPicPr>
+          <p:cNvPr id="6" name="Picture 5">
+            <a:extLst>
+              <a:ext uri="{FF2B5EF4-FFF2-40B4-BE49-F238E27FC236}">
+                <a16:creationId xmlns:a16="http://schemas.microsoft.com/office/drawing/2014/main" id="{8802FE5F-855D-4C11-BECC-F9D6C13D1769}"/>
+              </a:ext>
+            </a:extLst>
+          </p:cNvPr>
+          <p:cNvPicPr>
+            <a:picLocks noChangeAspect="1"/>
+          </p:cNvPicPr>
+          <p:nvPr/>
+        </p:nvPicPr>
+        <p:blipFill>
+          <a:blip r:embed="rId3"/>
+          <a:stretch>
+            <a:fillRect/>
+          </a:stretch>
+        </p:blipFill>
+        <p:spPr>
+          <a:xfrm>
+            <a:off x="5105400" y="2695879"/>
+            <a:ext cx="3654817" cy="2314663"/>
+          </a:xfrm>
+          <a:prstGeom prst="hexagon">
+            <a:avLst>
+              <a:gd name="adj" fmla="val 0"/>
+              <a:gd name="vf" fmla="val 115470"/>
+            </a:avLst>
+          </a:prstGeom>
+        </p:spPr>
+      </p:pic>
+    </p:spTree>
+    <p:extLst>
+      <p:ext uri="{BB962C8B-B14F-4D97-AF65-F5344CB8AC3E}">
+        <p14:creationId xmlns:p14="http://schemas.microsoft.com/office/powerpoint/2010/main" val="3232152703"/>
+      </p:ext>
+    </p:extLst>
+  </p:cSld>
+  <p:clrMapOvr>
+    <a:masterClrMapping/>
+  </p:clrMapOvr>
+</p:sld>
+</file>
+
+<file path=ppt/slides/slide16.xml><?xml version="1.0" encoding="utf-8"?>
 <p:sld xmlns:a="http://schemas.openxmlformats.org/drawingml/2006/main" xmlns:r="http://schemas.openxmlformats.org/officeDocument/2006/relationships" xmlns:p="http://schemas.openxmlformats.org/presentationml/2006/main">
   <p:cSld>
     <p:spTree>
@@ -3439,7 +3641,7 @@
 </p:sld>
 </file>
 
-<file path=ppt/slides/slide16.xml><?xml version="1.0" encoding="utf-8"?>
+<file path=ppt/slides/slide17.xml><?xml version="1.0" encoding="utf-8"?>
 <p:sld xmlns:a="http://schemas.openxmlformats.org/drawingml/2006/main" xmlns:r="http://schemas.openxmlformats.org/officeDocument/2006/relationships" xmlns:p="http://schemas.openxmlformats.org/presentationml/2006/main">
   <p:cSld>
     <p:spTree>
@@ -4668,7 +4870,7 @@
 </p:sld>
 </file>
 
-<file path=ppt/slides/slide17.xml><?xml version="1.0" encoding="utf-8"?>
+<file path=ppt/slides/slide18.xml><?xml version="1.0" encoding="utf-8"?>
 <p:sld xmlns:a="http://schemas.openxmlformats.org/drawingml/2006/main" xmlns:r="http://schemas.openxmlformats.org/officeDocument/2006/relationships" xmlns:p="http://schemas.openxmlformats.org/presentationml/2006/main">
   <p:cSld>
     <p:spTree>
@@ -6295,7 +6497,7 @@
 </p:sld>
 </file>
 
-<file path=ppt/slides/slide18.xml><?xml version="1.0" encoding="utf-8"?>
+<file path=ppt/slides/slide19.xml><?xml version="1.0" encoding="utf-8"?>
 <p:sld xmlns:a="http://schemas.openxmlformats.org/drawingml/2006/main" xmlns:r="http://schemas.openxmlformats.org/officeDocument/2006/relationships" xmlns:p="http://schemas.openxmlformats.org/presentationml/2006/main">
   <p:cSld>
     <p:spTree>
@@ -7434,902 +7636,6 @@
 </p:sld>
 </file>
 
-<file path=ppt/slides/slide19.xml><?xml version="1.0" encoding="utf-8"?>
-<p:sld xmlns:a="http://schemas.openxmlformats.org/drawingml/2006/main" xmlns:r="http://schemas.openxmlformats.org/officeDocument/2006/relationships" xmlns:p="http://schemas.openxmlformats.org/presentationml/2006/main">
-  <p:cSld>
-    <p:spTree>
-      <p:nvGrpSpPr>
-        <p:cNvPr id="1" name=""/>
-        <p:cNvGrpSpPr/>
-        <p:nvPr/>
-      </p:nvGrpSpPr>
-      <p:grpSpPr>
-        <a:xfrm>
-          <a:off x="0" y="0"/>
-          <a:ext cx="0" cy="0"/>
-          <a:chOff x="0" y="0"/>
-          <a:chExt cx="0" cy="0"/>
-        </a:xfrm>
-      </p:grpSpPr>
-      <p:sp>
-        <p:nvSpPr>
-          <p:cNvPr id="2" name="object 2"/>
-          <p:cNvSpPr txBox="1">
-            <a:spLocks noGrp="1"/>
-          </p:cNvSpPr>
-          <p:nvPr>
-            <p:ph type="title"/>
-          </p:nvPr>
-        </p:nvSpPr>
-        <p:spPr>
-          <a:xfrm>
-            <a:off x="517042" y="360375"/>
-            <a:ext cx="5268595" cy="406400"/>
-          </a:xfrm>
-          <a:prstGeom prst="rect">
-            <a:avLst/>
-          </a:prstGeom>
-        </p:spPr>
-        <p:txBody>
-          <a:bodyPr vert="horz" wrap="square" lIns="0" tIns="12065" rIns="0" bIns="0" rtlCol="0">
-            <a:spAutoFit/>
-          </a:bodyPr>
-          <a:lstStyle/>
-          <a:p>
-            <a:pPr marL="12700">
-              <a:lnSpc>
-                <a:spcPct val="100000"/>
-              </a:lnSpc>
-              <a:spcBef>
-                <a:spcPts val="95"/>
-              </a:spcBef>
-            </a:pPr>
-            <a:r>
-              <a:rPr sz="2500" spc="-5" dirty="0"/>
-              <a:t>Distribution</a:t>
-            </a:r>
-            <a:r>
-              <a:rPr sz="2500" spc="30" dirty="0"/>
-              <a:t> </a:t>
-            </a:r>
-            <a:r>
-              <a:rPr sz="2500" spc="-5" dirty="0"/>
-              <a:t>channel</a:t>
-            </a:r>
-            <a:r>
-              <a:rPr sz="2500" spc="5" dirty="0"/>
-              <a:t> wise</a:t>
-            </a:r>
-            <a:r>
-              <a:rPr sz="2500" dirty="0"/>
-              <a:t> </a:t>
-            </a:r>
-            <a:r>
-              <a:rPr sz="2500" spc="-5" dirty="0"/>
-              <a:t>Analysis</a:t>
-            </a:r>
-            <a:endParaRPr sz="2500"/>
-          </a:p>
-        </p:txBody>
-      </p:sp>
-      <p:sp>
-        <p:nvSpPr>
-          <p:cNvPr id="3" name="object 3"/>
-          <p:cNvSpPr txBox="1"/>
-          <p:nvPr/>
-        </p:nvSpPr>
-        <p:spPr>
-          <a:xfrm>
-            <a:off x="466750" y="1191259"/>
-            <a:ext cx="7200900" cy="1881505"/>
-          </a:xfrm>
-          <a:prstGeom prst="rect">
-            <a:avLst/>
-          </a:prstGeom>
-        </p:spPr>
-        <p:txBody>
-          <a:bodyPr vert="horz" wrap="square" lIns="0" tIns="13335" rIns="0" bIns="0" rtlCol="0">
-            <a:spAutoFit/>
-          </a:bodyPr>
-          <a:lstStyle/>
-          <a:p>
-            <a:pPr marL="12700">
-              <a:lnSpc>
-                <a:spcPct val="100000"/>
-              </a:lnSpc>
-              <a:spcBef>
-                <a:spcPts val="105"/>
-              </a:spcBef>
-            </a:pPr>
-            <a:r>
-              <a:rPr sz="1400" dirty="0">
-                <a:latin typeface="Arial MT"/>
-                <a:cs typeface="Arial MT"/>
-              </a:rPr>
-              <a:t>While</a:t>
-            </a:r>
-            <a:r>
-              <a:rPr sz="1400" spc="-25" dirty="0">
-                <a:latin typeface="Arial MT"/>
-                <a:cs typeface="Arial MT"/>
-              </a:rPr>
-              <a:t> </a:t>
-            </a:r>
-            <a:r>
-              <a:rPr sz="1400" dirty="0">
-                <a:latin typeface="Arial MT"/>
-                <a:cs typeface="Arial MT"/>
-              </a:rPr>
-              <a:t>doing</a:t>
-            </a:r>
-            <a:r>
-              <a:rPr sz="1400" spc="-10" dirty="0">
-                <a:latin typeface="Arial MT"/>
-                <a:cs typeface="Arial MT"/>
-              </a:rPr>
-              <a:t> </a:t>
-            </a:r>
-            <a:r>
-              <a:rPr sz="1400" spc="-5" dirty="0">
-                <a:latin typeface="Arial MT"/>
-                <a:cs typeface="Arial MT"/>
-              </a:rPr>
-              <a:t>Distribution</a:t>
-            </a:r>
-            <a:r>
-              <a:rPr sz="1400" spc="-35" dirty="0">
-                <a:latin typeface="Arial MT"/>
-                <a:cs typeface="Arial MT"/>
-              </a:rPr>
-              <a:t> </a:t>
-            </a:r>
-            <a:r>
-              <a:rPr sz="1400" dirty="0">
-                <a:latin typeface="Arial MT"/>
-                <a:cs typeface="Arial MT"/>
-              </a:rPr>
-              <a:t>channel</a:t>
-            </a:r>
-            <a:r>
-              <a:rPr sz="1400" spc="-25" dirty="0">
-                <a:latin typeface="Arial MT"/>
-                <a:cs typeface="Arial MT"/>
-              </a:rPr>
-              <a:t> </a:t>
-            </a:r>
-            <a:r>
-              <a:rPr sz="1400" spc="-5" dirty="0">
-                <a:latin typeface="Arial MT"/>
-                <a:cs typeface="Arial MT"/>
-              </a:rPr>
-              <a:t>wise</a:t>
-            </a:r>
-            <a:r>
-              <a:rPr sz="1400" dirty="0">
-                <a:latin typeface="Arial MT"/>
-                <a:cs typeface="Arial MT"/>
-              </a:rPr>
-              <a:t> </a:t>
-            </a:r>
-            <a:r>
-              <a:rPr sz="1400" spc="-5" dirty="0">
-                <a:latin typeface="Arial MT"/>
-                <a:cs typeface="Arial MT"/>
-              </a:rPr>
-              <a:t>analysis</a:t>
-            </a:r>
-            <a:r>
-              <a:rPr sz="1400" spc="5" dirty="0">
-                <a:latin typeface="Arial MT"/>
-                <a:cs typeface="Arial MT"/>
-              </a:rPr>
-              <a:t> </a:t>
-            </a:r>
-            <a:r>
-              <a:rPr sz="1400" dirty="0">
-                <a:latin typeface="Arial MT"/>
-                <a:cs typeface="Arial MT"/>
-              </a:rPr>
-              <a:t>of</a:t>
-            </a:r>
-            <a:r>
-              <a:rPr sz="1400" spc="-5" dirty="0">
-                <a:latin typeface="Arial MT"/>
-                <a:cs typeface="Arial MT"/>
-              </a:rPr>
-              <a:t> given</a:t>
-            </a:r>
-            <a:r>
-              <a:rPr sz="1400" dirty="0">
-                <a:latin typeface="Arial MT"/>
-                <a:cs typeface="Arial MT"/>
-              </a:rPr>
-              <a:t> hotel</a:t>
-            </a:r>
-            <a:r>
-              <a:rPr sz="1400" spc="-10" dirty="0">
-                <a:latin typeface="Arial MT"/>
-                <a:cs typeface="Arial MT"/>
-              </a:rPr>
-              <a:t> </a:t>
-            </a:r>
-            <a:r>
-              <a:rPr sz="1400" dirty="0">
-                <a:latin typeface="Arial MT"/>
-                <a:cs typeface="Arial MT"/>
-              </a:rPr>
-              <a:t>booking</a:t>
-            </a:r>
-            <a:r>
-              <a:rPr sz="1400" spc="-35" dirty="0">
-                <a:latin typeface="Arial MT"/>
-                <a:cs typeface="Arial MT"/>
-              </a:rPr>
-              <a:t> </a:t>
-            </a:r>
-            <a:r>
-              <a:rPr sz="1400" dirty="0">
-                <a:latin typeface="Arial MT"/>
-                <a:cs typeface="Arial MT"/>
-              </a:rPr>
-              <a:t>dataset,</a:t>
-            </a:r>
-            <a:r>
-              <a:rPr sz="1400" spc="-30" dirty="0">
-                <a:latin typeface="Arial MT"/>
-                <a:cs typeface="Arial MT"/>
-              </a:rPr>
-              <a:t> </a:t>
-            </a:r>
-            <a:r>
-              <a:rPr sz="1400" spc="-10" dirty="0">
-                <a:latin typeface="Arial MT"/>
-                <a:cs typeface="Arial MT"/>
-              </a:rPr>
-              <a:t>we</a:t>
-            </a:r>
-            <a:r>
-              <a:rPr sz="1400" spc="15" dirty="0">
-                <a:latin typeface="Arial MT"/>
-                <a:cs typeface="Arial MT"/>
-              </a:rPr>
-              <a:t> </a:t>
-            </a:r>
-            <a:r>
-              <a:rPr sz="1400" spc="-5" dirty="0">
-                <a:latin typeface="Arial MT"/>
-                <a:cs typeface="Arial MT"/>
-              </a:rPr>
-              <a:t>answered</a:t>
-            </a:r>
-            <a:endParaRPr sz="1400">
-              <a:latin typeface="Arial MT"/>
-              <a:cs typeface="Arial MT"/>
-            </a:endParaRPr>
-          </a:p>
-          <a:p>
-            <a:pPr marL="12700">
-              <a:lnSpc>
-                <a:spcPct val="100000"/>
-              </a:lnSpc>
-            </a:pPr>
-            <a:r>
-              <a:rPr sz="1400" spc="-5" dirty="0">
-                <a:latin typeface="Arial MT"/>
-                <a:cs typeface="Arial MT"/>
-              </a:rPr>
-              <a:t>following</a:t>
-            </a:r>
-            <a:r>
-              <a:rPr sz="1400" spc="-50" dirty="0">
-                <a:latin typeface="Arial MT"/>
-                <a:cs typeface="Arial MT"/>
-              </a:rPr>
-              <a:t> </a:t>
-            </a:r>
-            <a:r>
-              <a:rPr sz="1400" dirty="0">
-                <a:latin typeface="Arial MT"/>
-                <a:cs typeface="Arial MT"/>
-              </a:rPr>
-              <a:t>questions:</a:t>
-            </a:r>
-            <a:endParaRPr sz="1400">
-              <a:latin typeface="Arial MT"/>
-              <a:cs typeface="Arial MT"/>
-            </a:endParaRPr>
-          </a:p>
-          <a:p>
-            <a:pPr>
-              <a:lnSpc>
-                <a:spcPct val="100000"/>
-              </a:lnSpc>
-            </a:pPr>
-            <a:endParaRPr sz="1500">
-              <a:latin typeface="Arial MT"/>
-              <a:cs typeface="Arial MT"/>
-            </a:endParaRPr>
-          </a:p>
-          <a:p>
-            <a:pPr marL="393700" indent="-381635">
-              <a:lnSpc>
-                <a:spcPct val="100000"/>
-              </a:lnSpc>
-              <a:spcBef>
-                <a:spcPts val="1120"/>
-              </a:spcBef>
-              <a:buClr>
-                <a:srgbClr val="000000"/>
-              </a:buClr>
-              <a:buAutoNum type="arabicParenBoth"/>
-              <a:tabLst>
-                <a:tab pos="393700" algn="l"/>
-                <a:tab pos="394335" algn="l"/>
-              </a:tabLst>
-            </a:pPr>
-            <a:r>
-              <a:rPr sz="1400" spc="-10" dirty="0">
-                <a:solidFill>
-                  <a:srgbClr val="202020"/>
-                </a:solidFill>
-                <a:latin typeface="Roboto"/>
-                <a:cs typeface="Roboto"/>
-              </a:rPr>
-              <a:t>Which</a:t>
-            </a:r>
-            <a:r>
-              <a:rPr sz="1400" dirty="0">
-                <a:solidFill>
-                  <a:srgbClr val="202020"/>
-                </a:solidFill>
-                <a:latin typeface="Roboto"/>
-                <a:cs typeface="Roboto"/>
-              </a:rPr>
-              <a:t> </a:t>
-            </a:r>
-            <a:r>
-              <a:rPr sz="1400" spc="-15" dirty="0">
-                <a:solidFill>
-                  <a:srgbClr val="202020"/>
-                </a:solidFill>
-                <a:latin typeface="Roboto"/>
-                <a:cs typeface="Roboto"/>
-              </a:rPr>
-              <a:t>is</a:t>
-            </a:r>
-            <a:r>
-              <a:rPr sz="1400" spc="5" dirty="0">
-                <a:solidFill>
-                  <a:srgbClr val="202020"/>
-                </a:solidFill>
-                <a:latin typeface="Roboto"/>
-                <a:cs typeface="Roboto"/>
-              </a:rPr>
-              <a:t> </a:t>
-            </a:r>
-            <a:r>
-              <a:rPr sz="1400" spc="-15" dirty="0">
-                <a:solidFill>
-                  <a:srgbClr val="202020"/>
-                </a:solidFill>
-                <a:latin typeface="Roboto"/>
-                <a:cs typeface="Roboto"/>
-              </a:rPr>
-              <a:t>the</a:t>
-            </a:r>
-            <a:r>
-              <a:rPr sz="1400" dirty="0">
-                <a:solidFill>
-                  <a:srgbClr val="202020"/>
-                </a:solidFill>
-                <a:latin typeface="Roboto"/>
-                <a:cs typeface="Roboto"/>
-              </a:rPr>
-              <a:t> </a:t>
-            </a:r>
-            <a:r>
-              <a:rPr sz="1400" spc="-5" dirty="0">
-                <a:solidFill>
-                  <a:srgbClr val="202020"/>
-                </a:solidFill>
-                <a:latin typeface="Roboto"/>
-                <a:cs typeface="Roboto"/>
-              </a:rPr>
-              <a:t>most common</a:t>
-            </a:r>
-            <a:r>
-              <a:rPr sz="1400" spc="-20" dirty="0">
-                <a:solidFill>
-                  <a:srgbClr val="202020"/>
-                </a:solidFill>
-                <a:latin typeface="Roboto"/>
-                <a:cs typeface="Roboto"/>
-              </a:rPr>
-              <a:t> </a:t>
-            </a:r>
-            <a:r>
-              <a:rPr sz="1400" spc="-15" dirty="0">
-                <a:solidFill>
-                  <a:srgbClr val="202020"/>
-                </a:solidFill>
-                <a:latin typeface="Roboto"/>
-                <a:cs typeface="Roboto"/>
-              </a:rPr>
-              <a:t>channel</a:t>
-            </a:r>
-            <a:r>
-              <a:rPr sz="1400" spc="-5" dirty="0">
-                <a:solidFill>
-                  <a:srgbClr val="202020"/>
-                </a:solidFill>
-                <a:latin typeface="Roboto"/>
-                <a:cs typeface="Roboto"/>
-              </a:rPr>
-              <a:t> </a:t>
-            </a:r>
-            <a:r>
-              <a:rPr sz="1400" spc="50" dirty="0">
-                <a:solidFill>
-                  <a:srgbClr val="202020"/>
-                </a:solidFill>
-                <a:latin typeface="Roboto"/>
-                <a:cs typeface="Roboto"/>
-              </a:rPr>
-              <a:t>foí</a:t>
-            </a:r>
-            <a:r>
-              <a:rPr sz="1400" spc="-10" dirty="0">
-                <a:solidFill>
-                  <a:srgbClr val="202020"/>
-                </a:solidFill>
-                <a:latin typeface="Roboto"/>
-                <a:cs typeface="Roboto"/>
-              </a:rPr>
-              <a:t> booking</a:t>
-            </a:r>
-            <a:r>
-              <a:rPr sz="1400" spc="-20" dirty="0">
-                <a:solidFill>
-                  <a:srgbClr val="202020"/>
-                </a:solidFill>
-                <a:latin typeface="Roboto"/>
-                <a:cs typeface="Roboto"/>
-              </a:rPr>
-              <a:t> </a:t>
-            </a:r>
-            <a:r>
-              <a:rPr sz="1400" spc="-15" dirty="0">
-                <a:solidFill>
-                  <a:srgbClr val="202020"/>
-                </a:solidFill>
-                <a:latin typeface="Roboto"/>
-                <a:cs typeface="Roboto"/>
-              </a:rPr>
-              <a:t>hotels?</a:t>
-            </a:r>
-            <a:endParaRPr sz="1400">
-              <a:latin typeface="Roboto"/>
-              <a:cs typeface="Roboto"/>
-            </a:endParaRPr>
-          </a:p>
-          <a:p>
-            <a:pPr>
-              <a:lnSpc>
-                <a:spcPct val="100000"/>
-              </a:lnSpc>
-              <a:spcBef>
-                <a:spcPts val="55"/>
-              </a:spcBef>
-              <a:buFont typeface="Roboto"/>
-              <a:buAutoNum type="arabicParenBoth"/>
-            </a:pPr>
-            <a:endParaRPr sz="1350">
-              <a:latin typeface="Roboto"/>
-              <a:cs typeface="Roboto"/>
-            </a:endParaRPr>
-          </a:p>
-          <a:p>
-            <a:pPr marL="355600" indent="-343535">
-              <a:lnSpc>
-                <a:spcPct val="100000"/>
-              </a:lnSpc>
-              <a:spcBef>
-                <a:spcPts val="5"/>
-              </a:spcBef>
-              <a:buClr>
-                <a:srgbClr val="000000"/>
-              </a:buClr>
-              <a:buAutoNum type="arabicParenBoth"/>
-              <a:tabLst>
-                <a:tab pos="356235" algn="l"/>
-              </a:tabLst>
-            </a:pPr>
-            <a:r>
-              <a:rPr sz="1400" spc="-10" dirty="0">
-                <a:solidFill>
-                  <a:srgbClr val="202020"/>
-                </a:solidFill>
-                <a:latin typeface="Roboto"/>
-                <a:cs typeface="Roboto"/>
-              </a:rPr>
-              <a:t>Which</a:t>
-            </a:r>
-            <a:r>
-              <a:rPr sz="1400" dirty="0">
-                <a:solidFill>
-                  <a:srgbClr val="202020"/>
-                </a:solidFill>
-                <a:latin typeface="Roboto"/>
-                <a:cs typeface="Roboto"/>
-              </a:rPr>
-              <a:t> </a:t>
-            </a:r>
-            <a:r>
-              <a:rPr sz="1400" spc="-15" dirty="0">
-                <a:solidFill>
-                  <a:srgbClr val="202020"/>
-                </a:solidFill>
-                <a:latin typeface="Roboto"/>
-                <a:cs typeface="Roboto"/>
-              </a:rPr>
-              <a:t>channel</a:t>
-            </a:r>
-            <a:r>
-              <a:rPr sz="1400" dirty="0">
-                <a:solidFill>
-                  <a:srgbClr val="202020"/>
-                </a:solidFill>
-                <a:latin typeface="Roboto"/>
-                <a:cs typeface="Roboto"/>
-              </a:rPr>
-              <a:t> </a:t>
-            </a:r>
-            <a:r>
-              <a:rPr sz="1400" spc="-15" dirty="0">
-                <a:solidFill>
-                  <a:srgbClr val="202020"/>
-                </a:solidFill>
-                <a:latin typeface="Roboto"/>
-                <a:cs typeface="Roboto"/>
-              </a:rPr>
-              <a:t>is</a:t>
-            </a:r>
-            <a:r>
-              <a:rPr sz="1400" dirty="0">
-                <a:solidFill>
-                  <a:srgbClr val="202020"/>
-                </a:solidFill>
-                <a:latin typeface="Roboto"/>
-                <a:cs typeface="Roboto"/>
-              </a:rPr>
-              <a:t> </a:t>
-            </a:r>
-            <a:r>
-              <a:rPr sz="1400" spc="-15" dirty="0">
-                <a:solidFill>
-                  <a:srgbClr val="202020"/>
-                </a:solidFill>
-                <a:latin typeface="Roboto"/>
-                <a:cs typeface="Roboto"/>
-              </a:rPr>
-              <a:t>mostly</a:t>
-            </a:r>
-            <a:r>
-              <a:rPr sz="1400" spc="-5" dirty="0">
-                <a:solidFill>
-                  <a:srgbClr val="202020"/>
-                </a:solidFill>
-                <a:latin typeface="Roboto"/>
-                <a:cs typeface="Roboto"/>
-              </a:rPr>
-              <a:t> </a:t>
-            </a:r>
-            <a:r>
-              <a:rPr sz="1400" spc="-10" dirty="0">
-                <a:solidFill>
-                  <a:srgbClr val="202020"/>
-                </a:solidFill>
-                <a:latin typeface="Roboto"/>
-                <a:cs typeface="Roboto"/>
-              </a:rPr>
-              <a:t>used</a:t>
-            </a:r>
-            <a:r>
-              <a:rPr sz="1400" spc="5" dirty="0">
-                <a:solidFill>
-                  <a:srgbClr val="202020"/>
-                </a:solidFill>
-                <a:latin typeface="Roboto"/>
-                <a:cs typeface="Roboto"/>
-              </a:rPr>
-              <a:t> </a:t>
-            </a:r>
-            <a:r>
-              <a:rPr sz="1400" spc="50" dirty="0">
-                <a:solidFill>
-                  <a:srgbClr val="202020"/>
-                </a:solidFill>
-                <a:latin typeface="Roboto"/>
-                <a:cs typeface="Roboto"/>
-              </a:rPr>
-              <a:t>foí</a:t>
-            </a:r>
-            <a:r>
-              <a:rPr sz="1400" spc="-5" dirty="0">
-                <a:solidFill>
-                  <a:srgbClr val="202020"/>
-                </a:solidFill>
-                <a:latin typeface="Roboto"/>
-                <a:cs typeface="Roboto"/>
-              </a:rPr>
-              <a:t> </a:t>
-            </a:r>
-            <a:r>
-              <a:rPr sz="1400" spc="10" dirty="0">
-                <a:solidFill>
-                  <a:srgbClr val="202020"/>
-                </a:solidFill>
-                <a:latin typeface="Roboto"/>
-                <a:cs typeface="Roboto"/>
-              </a:rPr>
-              <a:t>eaíly</a:t>
-            </a:r>
-            <a:r>
-              <a:rPr sz="1400" spc="-15" dirty="0">
-                <a:solidFill>
-                  <a:srgbClr val="202020"/>
-                </a:solidFill>
-                <a:latin typeface="Roboto"/>
-                <a:cs typeface="Roboto"/>
-              </a:rPr>
-              <a:t> </a:t>
-            </a:r>
-            <a:r>
-              <a:rPr sz="1400" spc="-10" dirty="0">
-                <a:solidFill>
-                  <a:srgbClr val="202020"/>
-                </a:solidFill>
-                <a:latin typeface="Roboto"/>
-                <a:cs typeface="Roboto"/>
-              </a:rPr>
-              <a:t>booking </a:t>
-            </a:r>
-            <a:r>
-              <a:rPr sz="1400" spc="10" dirty="0">
-                <a:solidFill>
-                  <a:srgbClr val="202020"/>
-                </a:solidFill>
-                <a:latin typeface="Roboto"/>
-                <a:cs typeface="Roboto"/>
-              </a:rPr>
-              <a:t>of</a:t>
-            </a:r>
-            <a:r>
-              <a:rPr sz="1400" spc="-5" dirty="0">
-                <a:solidFill>
-                  <a:srgbClr val="202020"/>
-                </a:solidFill>
-                <a:latin typeface="Roboto"/>
-                <a:cs typeface="Roboto"/>
-              </a:rPr>
-              <a:t> </a:t>
-            </a:r>
-            <a:r>
-              <a:rPr sz="1400" spc="-15" dirty="0">
-                <a:solidFill>
-                  <a:srgbClr val="202020"/>
-                </a:solidFill>
-                <a:latin typeface="Roboto"/>
-                <a:cs typeface="Roboto"/>
-              </a:rPr>
-              <a:t>hotels?</a:t>
-            </a:r>
-            <a:endParaRPr sz="1400">
-              <a:latin typeface="Roboto"/>
-              <a:cs typeface="Roboto"/>
-            </a:endParaRPr>
-          </a:p>
-          <a:p>
-            <a:pPr>
-              <a:lnSpc>
-                <a:spcPct val="100000"/>
-              </a:lnSpc>
-              <a:buFont typeface="Roboto"/>
-              <a:buAutoNum type="arabicParenBoth"/>
-            </a:pPr>
-            <a:endParaRPr sz="1400">
-              <a:latin typeface="Roboto"/>
-              <a:cs typeface="Roboto"/>
-            </a:endParaRPr>
-          </a:p>
-          <a:p>
-            <a:pPr marL="355600" indent="-343535">
-              <a:lnSpc>
-                <a:spcPct val="100000"/>
-              </a:lnSpc>
-              <a:buClr>
-                <a:srgbClr val="000000"/>
-              </a:buClr>
-              <a:buAutoNum type="arabicParenBoth"/>
-              <a:tabLst>
-                <a:tab pos="356235" algn="l"/>
-              </a:tabLst>
-            </a:pPr>
-            <a:r>
-              <a:rPr sz="1400" spc="-10" dirty="0">
-                <a:solidFill>
-                  <a:srgbClr val="202020"/>
-                </a:solidFill>
-                <a:latin typeface="Roboto"/>
-                <a:cs typeface="Roboto"/>
-              </a:rPr>
-              <a:t>Which</a:t>
-            </a:r>
-            <a:r>
-              <a:rPr sz="1400" spc="10" dirty="0">
-                <a:solidFill>
-                  <a:srgbClr val="202020"/>
-                </a:solidFill>
-                <a:latin typeface="Roboto"/>
-                <a:cs typeface="Roboto"/>
-              </a:rPr>
-              <a:t> </a:t>
-            </a:r>
-            <a:r>
-              <a:rPr sz="1400" spc="-5" dirty="0">
-                <a:solidFill>
-                  <a:srgbClr val="202020"/>
-                </a:solidFill>
-                <a:latin typeface="Roboto"/>
-                <a:cs typeface="Roboto"/>
-              </a:rPr>
-              <a:t>distíibution</a:t>
-            </a:r>
-            <a:r>
-              <a:rPr sz="1400" spc="15" dirty="0">
-                <a:solidFill>
-                  <a:srgbClr val="202020"/>
-                </a:solidFill>
-                <a:latin typeface="Roboto"/>
-                <a:cs typeface="Roboto"/>
-              </a:rPr>
-              <a:t> </a:t>
-            </a:r>
-            <a:r>
-              <a:rPr sz="1400" spc="-15" dirty="0">
-                <a:solidFill>
-                  <a:srgbClr val="202020"/>
-                </a:solidFill>
-                <a:latin typeface="Roboto"/>
-                <a:cs typeface="Roboto"/>
-              </a:rPr>
-              <a:t>channel</a:t>
-            </a:r>
-            <a:r>
-              <a:rPr sz="1400" spc="-10" dirty="0">
-                <a:solidFill>
-                  <a:srgbClr val="202020"/>
-                </a:solidFill>
-                <a:latin typeface="Roboto"/>
-                <a:cs typeface="Roboto"/>
-              </a:rPr>
-              <a:t> </a:t>
-            </a:r>
-            <a:r>
-              <a:rPr sz="1400" spc="10" dirty="0">
-                <a:solidFill>
-                  <a:srgbClr val="202020"/>
-                </a:solidFill>
-                <a:latin typeface="Roboto"/>
-                <a:cs typeface="Roboto"/>
-              </a:rPr>
-              <a:t>bíings</a:t>
-            </a:r>
-            <a:r>
-              <a:rPr sz="1400" spc="-5" dirty="0">
-                <a:solidFill>
-                  <a:srgbClr val="202020"/>
-                </a:solidFill>
-                <a:latin typeface="Roboto"/>
-                <a:cs typeface="Roboto"/>
-              </a:rPr>
-              <a:t> </a:t>
-            </a:r>
-            <a:r>
-              <a:rPr sz="1400" spc="15" dirty="0">
-                <a:solidFill>
-                  <a:srgbClr val="202020"/>
-                </a:solidFill>
-                <a:latin typeface="Roboto"/>
-                <a:cs typeface="Roboto"/>
-              </a:rPr>
-              <a:t>betteí </a:t>
-            </a:r>
-            <a:r>
-              <a:rPr sz="1400" spc="10" dirty="0">
-                <a:solidFill>
-                  <a:srgbClr val="202020"/>
-                </a:solidFill>
-                <a:latin typeface="Roboto"/>
-                <a:cs typeface="Roboto"/>
-              </a:rPr>
-              <a:t>íevenue</a:t>
-            </a:r>
-            <a:r>
-              <a:rPr sz="1400" spc="-40" dirty="0">
-                <a:solidFill>
-                  <a:srgbClr val="202020"/>
-                </a:solidFill>
-                <a:latin typeface="Roboto"/>
-                <a:cs typeface="Roboto"/>
-              </a:rPr>
-              <a:t> </a:t>
-            </a:r>
-            <a:r>
-              <a:rPr sz="1400" dirty="0">
-                <a:solidFill>
-                  <a:srgbClr val="202020"/>
-                </a:solidFill>
-                <a:latin typeface="Roboto"/>
-                <a:cs typeface="Roboto"/>
-              </a:rPr>
-              <a:t>geneíating</a:t>
-            </a:r>
-            <a:r>
-              <a:rPr sz="1400" spc="-10" dirty="0">
-                <a:solidFill>
-                  <a:srgbClr val="202020"/>
-                </a:solidFill>
-                <a:latin typeface="Roboto"/>
-                <a:cs typeface="Roboto"/>
-              </a:rPr>
-              <a:t> deals </a:t>
-            </a:r>
-            <a:r>
-              <a:rPr sz="1400" spc="50" dirty="0">
-                <a:solidFill>
-                  <a:srgbClr val="202020"/>
-                </a:solidFill>
-                <a:latin typeface="Roboto"/>
-                <a:cs typeface="Roboto"/>
-              </a:rPr>
-              <a:t>foí</a:t>
-            </a:r>
-            <a:r>
-              <a:rPr sz="1400" dirty="0">
-                <a:solidFill>
-                  <a:srgbClr val="202020"/>
-                </a:solidFill>
-                <a:latin typeface="Roboto"/>
-                <a:cs typeface="Roboto"/>
-              </a:rPr>
-              <a:t> </a:t>
-            </a:r>
-            <a:r>
-              <a:rPr sz="1400" spc="-15" dirty="0">
-                <a:solidFill>
-                  <a:srgbClr val="202020"/>
-                </a:solidFill>
-                <a:latin typeface="Roboto"/>
-                <a:cs typeface="Roboto"/>
-              </a:rPr>
-              <a:t>hotels?</a:t>
-            </a:r>
-            <a:endParaRPr sz="1400">
-              <a:latin typeface="Roboto"/>
-              <a:cs typeface="Roboto"/>
-            </a:endParaRPr>
-          </a:p>
-        </p:txBody>
-      </p:sp>
-    </p:spTree>
-  </p:cSld>
-  <p:clrMapOvr>
-    <a:masterClrMapping/>
-  </p:clrMapOvr>
-</p:sld>
-</file>
-
 <file path=ppt/slides/slide2.xml><?xml version="1.0" encoding="utf-8"?>
 <p:sld xmlns:a="http://schemas.openxmlformats.org/drawingml/2006/main" xmlns:r="http://schemas.openxmlformats.org/officeDocument/2006/relationships" xmlns:p="http://schemas.openxmlformats.org/presentationml/2006/main">
   <p:cSld>
@@ -8905,6 +8211,902 @@
 </file>
 
 <file path=ppt/slides/slide20.xml><?xml version="1.0" encoding="utf-8"?>
+<p:sld xmlns:a="http://schemas.openxmlformats.org/drawingml/2006/main" xmlns:r="http://schemas.openxmlformats.org/officeDocument/2006/relationships" xmlns:p="http://schemas.openxmlformats.org/presentationml/2006/main">
+  <p:cSld>
+    <p:spTree>
+      <p:nvGrpSpPr>
+        <p:cNvPr id="1" name=""/>
+        <p:cNvGrpSpPr/>
+        <p:nvPr/>
+      </p:nvGrpSpPr>
+      <p:grpSpPr>
+        <a:xfrm>
+          <a:off x="0" y="0"/>
+          <a:ext cx="0" cy="0"/>
+          <a:chOff x="0" y="0"/>
+          <a:chExt cx="0" cy="0"/>
+        </a:xfrm>
+      </p:grpSpPr>
+      <p:sp>
+        <p:nvSpPr>
+          <p:cNvPr id="2" name="object 2"/>
+          <p:cNvSpPr txBox="1">
+            <a:spLocks noGrp="1"/>
+          </p:cNvSpPr>
+          <p:nvPr>
+            <p:ph type="title"/>
+          </p:nvPr>
+        </p:nvSpPr>
+        <p:spPr>
+          <a:xfrm>
+            <a:off x="517042" y="360375"/>
+            <a:ext cx="5268595" cy="406400"/>
+          </a:xfrm>
+          <a:prstGeom prst="rect">
+            <a:avLst/>
+          </a:prstGeom>
+        </p:spPr>
+        <p:txBody>
+          <a:bodyPr vert="horz" wrap="square" lIns="0" tIns="12065" rIns="0" bIns="0" rtlCol="0">
+            <a:spAutoFit/>
+          </a:bodyPr>
+          <a:lstStyle/>
+          <a:p>
+            <a:pPr marL="12700">
+              <a:lnSpc>
+                <a:spcPct val="100000"/>
+              </a:lnSpc>
+              <a:spcBef>
+                <a:spcPts val="95"/>
+              </a:spcBef>
+            </a:pPr>
+            <a:r>
+              <a:rPr sz="2500" spc="-5" dirty="0"/>
+              <a:t>Distribution</a:t>
+            </a:r>
+            <a:r>
+              <a:rPr sz="2500" spc="30" dirty="0"/>
+              <a:t> </a:t>
+            </a:r>
+            <a:r>
+              <a:rPr sz="2500" spc="-5" dirty="0"/>
+              <a:t>channel</a:t>
+            </a:r>
+            <a:r>
+              <a:rPr sz="2500" spc="5" dirty="0"/>
+              <a:t> wise</a:t>
+            </a:r>
+            <a:r>
+              <a:rPr sz="2500" dirty="0"/>
+              <a:t> </a:t>
+            </a:r>
+            <a:r>
+              <a:rPr sz="2500" spc="-5" dirty="0"/>
+              <a:t>Analysis</a:t>
+            </a:r>
+            <a:endParaRPr sz="2500"/>
+          </a:p>
+        </p:txBody>
+      </p:sp>
+      <p:sp>
+        <p:nvSpPr>
+          <p:cNvPr id="3" name="object 3"/>
+          <p:cNvSpPr txBox="1"/>
+          <p:nvPr/>
+        </p:nvSpPr>
+        <p:spPr>
+          <a:xfrm>
+            <a:off x="466750" y="1191259"/>
+            <a:ext cx="7200900" cy="1881505"/>
+          </a:xfrm>
+          <a:prstGeom prst="rect">
+            <a:avLst/>
+          </a:prstGeom>
+        </p:spPr>
+        <p:txBody>
+          <a:bodyPr vert="horz" wrap="square" lIns="0" tIns="13335" rIns="0" bIns="0" rtlCol="0">
+            <a:spAutoFit/>
+          </a:bodyPr>
+          <a:lstStyle/>
+          <a:p>
+            <a:pPr marL="12700">
+              <a:lnSpc>
+                <a:spcPct val="100000"/>
+              </a:lnSpc>
+              <a:spcBef>
+                <a:spcPts val="105"/>
+              </a:spcBef>
+            </a:pPr>
+            <a:r>
+              <a:rPr sz="1400" dirty="0">
+                <a:latin typeface="Arial MT"/>
+                <a:cs typeface="Arial MT"/>
+              </a:rPr>
+              <a:t>While</a:t>
+            </a:r>
+            <a:r>
+              <a:rPr sz="1400" spc="-25" dirty="0">
+                <a:latin typeface="Arial MT"/>
+                <a:cs typeface="Arial MT"/>
+              </a:rPr>
+              <a:t> </a:t>
+            </a:r>
+            <a:r>
+              <a:rPr sz="1400" dirty="0">
+                <a:latin typeface="Arial MT"/>
+                <a:cs typeface="Arial MT"/>
+              </a:rPr>
+              <a:t>doing</a:t>
+            </a:r>
+            <a:r>
+              <a:rPr sz="1400" spc="-10" dirty="0">
+                <a:latin typeface="Arial MT"/>
+                <a:cs typeface="Arial MT"/>
+              </a:rPr>
+              <a:t> </a:t>
+            </a:r>
+            <a:r>
+              <a:rPr sz="1400" spc="-5" dirty="0">
+                <a:latin typeface="Arial MT"/>
+                <a:cs typeface="Arial MT"/>
+              </a:rPr>
+              <a:t>Distribution</a:t>
+            </a:r>
+            <a:r>
+              <a:rPr sz="1400" spc="-35" dirty="0">
+                <a:latin typeface="Arial MT"/>
+                <a:cs typeface="Arial MT"/>
+              </a:rPr>
+              <a:t> </a:t>
+            </a:r>
+            <a:r>
+              <a:rPr sz="1400" dirty="0">
+                <a:latin typeface="Arial MT"/>
+                <a:cs typeface="Arial MT"/>
+              </a:rPr>
+              <a:t>channel</a:t>
+            </a:r>
+            <a:r>
+              <a:rPr sz="1400" spc="-25" dirty="0">
+                <a:latin typeface="Arial MT"/>
+                <a:cs typeface="Arial MT"/>
+              </a:rPr>
+              <a:t> </a:t>
+            </a:r>
+            <a:r>
+              <a:rPr sz="1400" spc="-5" dirty="0">
+                <a:latin typeface="Arial MT"/>
+                <a:cs typeface="Arial MT"/>
+              </a:rPr>
+              <a:t>wise</a:t>
+            </a:r>
+            <a:r>
+              <a:rPr sz="1400" dirty="0">
+                <a:latin typeface="Arial MT"/>
+                <a:cs typeface="Arial MT"/>
+              </a:rPr>
+              <a:t> </a:t>
+            </a:r>
+            <a:r>
+              <a:rPr sz="1400" spc="-5" dirty="0">
+                <a:latin typeface="Arial MT"/>
+                <a:cs typeface="Arial MT"/>
+              </a:rPr>
+              <a:t>analysis</a:t>
+            </a:r>
+            <a:r>
+              <a:rPr sz="1400" spc="5" dirty="0">
+                <a:latin typeface="Arial MT"/>
+                <a:cs typeface="Arial MT"/>
+              </a:rPr>
+              <a:t> </a:t>
+            </a:r>
+            <a:r>
+              <a:rPr sz="1400" dirty="0">
+                <a:latin typeface="Arial MT"/>
+                <a:cs typeface="Arial MT"/>
+              </a:rPr>
+              <a:t>of</a:t>
+            </a:r>
+            <a:r>
+              <a:rPr sz="1400" spc="-5" dirty="0">
+                <a:latin typeface="Arial MT"/>
+                <a:cs typeface="Arial MT"/>
+              </a:rPr>
+              <a:t> given</a:t>
+            </a:r>
+            <a:r>
+              <a:rPr sz="1400" dirty="0">
+                <a:latin typeface="Arial MT"/>
+                <a:cs typeface="Arial MT"/>
+              </a:rPr>
+              <a:t> hotel</a:t>
+            </a:r>
+            <a:r>
+              <a:rPr sz="1400" spc="-10" dirty="0">
+                <a:latin typeface="Arial MT"/>
+                <a:cs typeface="Arial MT"/>
+              </a:rPr>
+              <a:t> </a:t>
+            </a:r>
+            <a:r>
+              <a:rPr sz="1400" dirty="0">
+                <a:latin typeface="Arial MT"/>
+                <a:cs typeface="Arial MT"/>
+              </a:rPr>
+              <a:t>booking</a:t>
+            </a:r>
+            <a:r>
+              <a:rPr sz="1400" spc="-35" dirty="0">
+                <a:latin typeface="Arial MT"/>
+                <a:cs typeface="Arial MT"/>
+              </a:rPr>
+              <a:t> </a:t>
+            </a:r>
+            <a:r>
+              <a:rPr sz="1400" dirty="0">
+                <a:latin typeface="Arial MT"/>
+                <a:cs typeface="Arial MT"/>
+              </a:rPr>
+              <a:t>dataset,</a:t>
+            </a:r>
+            <a:r>
+              <a:rPr sz="1400" spc="-30" dirty="0">
+                <a:latin typeface="Arial MT"/>
+                <a:cs typeface="Arial MT"/>
+              </a:rPr>
+              <a:t> </a:t>
+            </a:r>
+            <a:r>
+              <a:rPr sz="1400" spc="-10" dirty="0">
+                <a:latin typeface="Arial MT"/>
+                <a:cs typeface="Arial MT"/>
+              </a:rPr>
+              <a:t>we</a:t>
+            </a:r>
+            <a:r>
+              <a:rPr sz="1400" spc="15" dirty="0">
+                <a:latin typeface="Arial MT"/>
+                <a:cs typeface="Arial MT"/>
+              </a:rPr>
+              <a:t> </a:t>
+            </a:r>
+            <a:r>
+              <a:rPr sz="1400" spc="-5" dirty="0">
+                <a:latin typeface="Arial MT"/>
+                <a:cs typeface="Arial MT"/>
+              </a:rPr>
+              <a:t>answered</a:t>
+            </a:r>
+            <a:endParaRPr sz="1400">
+              <a:latin typeface="Arial MT"/>
+              <a:cs typeface="Arial MT"/>
+            </a:endParaRPr>
+          </a:p>
+          <a:p>
+            <a:pPr marL="12700">
+              <a:lnSpc>
+                <a:spcPct val="100000"/>
+              </a:lnSpc>
+            </a:pPr>
+            <a:r>
+              <a:rPr sz="1400" spc="-5" dirty="0">
+                <a:latin typeface="Arial MT"/>
+                <a:cs typeface="Arial MT"/>
+              </a:rPr>
+              <a:t>following</a:t>
+            </a:r>
+            <a:r>
+              <a:rPr sz="1400" spc="-50" dirty="0">
+                <a:latin typeface="Arial MT"/>
+                <a:cs typeface="Arial MT"/>
+              </a:rPr>
+              <a:t> </a:t>
+            </a:r>
+            <a:r>
+              <a:rPr sz="1400" dirty="0">
+                <a:latin typeface="Arial MT"/>
+                <a:cs typeface="Arial MT"/>
+              </a:rPr>
+              <a:t>questions:</a:t>
+            </a:r>
+            <a:endParaRPr sz="1400">
+              <a:latin typeface="Arial MT"/>
+              <a:cs typeface="Arial MT"/>
+            </a:endParaRPr>
+          </a:p>
+          <a:p>
+            <a:pPr>
+              <a:lnSpc>
+                <a:spcPct val="100000"/>
+              </a:lnSpc>
+            </a:pPr>
+            <a:endParaRPr sz="1500">
+              <a:latin typeface="Arial MT"/>
+              <a:cs typeface="Arial MT"/>
+            </a:endParaRPr>
+          </a:p>
+          <a:p>
+            <a:pPr marL="393700" indent="-381635">
+              <a:lnSpc>
+                <a:spcPct val="100000"/>
+              </a:lnSpc>
+              <a:spcBef>
+                <a:spcPts val="1120"/>
+              </a:spcBef>
+              <a:buClr>
+                <a:srgbClr val="000000"/>
+              </a:buClr>
+              <a:buAutoNum type="arabicParenBoth"/>
+              <a:tabLst>
+                <a:tab pos="393700" algn="l"/>
+                <a:tab pos="394335" algn="l"/>
+              </a:tabLst>
+            </a:pPr>
+            <a:r>
+              <a:rPr sz="1400" spc="-10" dirty="0">
+                <a:solidFill>
+                  <a:srgbClr val="202020"/>
+                </a:solidFill>
+                <a:latin typeface="Roboto"/>
+                <a:cs typeface="Roboto"/>
+              </a:rPr>
+              <a:t>Which</a:t>
+            </a:r>
+            <a:r>
+              <a:rPr sz="1400" dirty="0">
+                <a:solidFill>
+                  <a:srgbClr val="202020"/>
+                </a:solidFill>
+                <a:latin typeface="Roboto"/>
+                <a:cs typeface="Roboto"/>
+              </a:rPr>
+              <a:t> </a:t>
+            </a:r>
+            <a:r>
+              <a:rPr sz="1400" spc="-15" dirty="0">
+                <a:solidFill>
+                  <a:srgbClr val="202020"/>
+                </a:solidFill>
+                <a:latin typeface="Roboto"/>
+                <a:cs typeface="Roboto"/>
+              </a:rPr>
+              <a:t>is</a:t>
+            </a:r>
+            <a:r>
+              <a:rPr sz="1400" spc="5" dirty="0">
+                <a:solidFill>
+                  <a:srgbClr val="202020"/>
+                </a:solidFill>
+                <a:latin typeface="Roboto"/>
+                <a:cs typeface="Roboto"/>
+              </a:rPr>
+              <a:t> </a:t>
+            </a:r>
+            <a:r>
+              <a:rPr sz="1400" spc="-15" dirty="0">
+                <a:solidFill>
+                  <a:srgbClr val="202020"/>
+                </a:solidFill>
+                <a:latin typeface="Roboto"/>
+                <a:cs typeface="Roboto"/>
+              </a:rPr>
+              <a:t>the</a:t>
+            </a:r>
+            <a:r>
+              <a:rPr sz="1400" dirty="0">
+                <a:solidFill>
+                  <a:srgbClr val="202020"/>
+                </a:solidFill>
+                <a:latin typeface="Roboto"/>
+                <a:cs typeface="Roboto"/>
+              </a:rPr>
+              <a:t> </a:t>
+            </a:r>
+            <a:r>
+              <a:rPr sz="1400" spc="-5" dirty="0">
+                <a:solidFill>
+                  <a:srgbClr val="202020"/>
+                </a:solidFill>
+                <a:latin typeface="Roboto"/>
+                <a:cs typeface="Roboto"/>
+              </a:rPr>
+              <a:t>most common</a:t>
+            </a:r>
+            <a:r>
+              <a:rPr sz="1400" spc="-20" dirty="0">
+                <a:solidFill>
+                  <a:srgbClr val="202020"/>
+                </a:solidFill>
+                <a:latin typeface="Roboto"/>
+                <a:cs typeface="Roboto"/>
+              </a:rPr>
+              <a:t> </a:t>
+            </a:r>
+            <a:r>
+              <a:rPr sz="1400" spc="-15" dirty="0">
+                <a:solidFill>
+                  <a:srgbClr val="202020"/>
+                </a:solidFill>
+                <a:latin typeface="Roboto"/>
+                <a:cs typeface="Roboto"/>
+              </a:rPr>
+              <a:t>channel</a:t>
+            </a:r>
+            <a:r>
+              <a:rPr sz="1400" spc="-5" dirty="0">
+                <a:solidFill>
+                  <a:srgbClr val="202020"/>
+                </a:solidFill>
+                <a:latin typeface="Roboto"/>
+                <a:cs typeface="Roboto"/>
+              </a:rPr>
+              <a:t> </a:t>
+            </a:r>
+            <a:r>
+              <a:rPr sz="1400" spc="50" dirty="0">
+                <a:solidFill>
+                  <a:srgbClr val="202020"/>
+                </a:solidFill>
+                <a:latin typeface="Roboto"/>
+                <a:cs typeface="Roboto"/>
+              </a:rPr>
+              <a:t>foí</a:t>
+            </a:r>
+            <a:r>
+              <a:rPr sz="1400" spc="-10" dirty="0">
+                <a:solidFill>
+                  <a:srgbClr val="202020"/>
+                </a:solidFill>
+                <a:latin typeface="Roboto"/>
+                <a:cs typeface="Roboto"/>
+              </a:rPr>
+              <a:t> booking</a:t>
+            </a:r>
+            <a:r>
+              <a:rPr sz="1400" spc="-20" dirty="0">
+                <a:solidFill>
+                  <a:srgbClr val="202020"/>
+                </a:solidFill>
+                <a:latin typeface="Roboto"/>
+                <a:cs typeface="Roboto"/>
+              </a:rPr>
+              <a:t> </a:t>
+            </a:r>
+            <a:r>
+              <a:rPr sz="1400" spc="-15" dirty="0">
+                <a:solidFill>
+                  <a:srgbClr val="202020"/>
+                </a:solidFill>
+                <a:latin typeface="Roboto"/>
+                <a:cs typeface="Roboto"/>
+              </a:rPr>
+              <a:t>hotels?</a:t>
+            </a:r>
+            <a:endParaRPr sz="1400">
+              <a:latin typeface="Roboto"/>
+              <a:cs typeface="Roboto"/>
+            </a:endParaRPr>
+          </a:p>
+          <a:p>
+            <a:pPr>
+              <a:lnSpc>
+                <a:spcPct val="100000"/>
+              </a:lnSpc>
+              <a:spcBef>
+                <a:spcPts val="55"/>
+              </a:spcBef>
+              <a:buFont typeface="Roboto"/>
+              <a:buAutoNum type="arabicParenBoth"/>
+            </a:pPr>
+            <a:endParaRPr sz="1350">
+              <a:latin typeface="Roboto"/>
+              <a:cs typeface="Roboto"/>
+            </a:endParaRPr>
+          </a:p>
+          <a:p>
+            <a:pPr marL="355600" indent="-343535">
+              <a:lnSpc>
+                <a:spcPct val="100000"/>
+              </a:lnSpc>
+              <a:spcBef>
+                <a:spcPts val="5"/>
+              </a:spcBef>
+              <a:buClr>
+                <a:srgbClr val="000000"/>
+              </a:buClr>
+              <a:buAutoNum type="arabicParenBoth"/>
+              <a:tabLst>
+                <a:tab pos="356235" algn="l"/>
+              </a:tabLst>
+            </a:pPr>
+            <a:r>
+              <a:rPr sz="1400" spc="-10" dirty="0">
+                <a:solidFill>
+                  <a:srgbClr val="202020"/>
+                </a:solidFill>
+                <a:latin typeface="Roboto"/>
+                <a:cs typeface="Roboto"/>
+              </a:rPr>
+              <a:t>Which</a:t>
+            </a:r>
+            <a:r>
+              <a:rPr sz="1400" dirty="0">
+                <a:solidFill>
+                  <a:srgbClr val="202020"/>
+                </a:solidFill>
+                <a:latin typeface="Roboto"/>
+                <a:cs typeface="Roboto"/>
+              </a:rPr>
+              <a:t> </a:t>
+            </a:r>
+            <a:r>
+              <a:rPr sz="1400" spc="-15" dirty="0">
+                <a:solidFill>
+                  <a:srgbClr val="202020"/>
+                </a:solidFill>
+                <a:latin typeface="Roboto"/>
+                <a:cs typeface="Roboto"/>
+              </a:rPr>
+              <a:t>channel</a:t>
+            </a:r>
+            <a:r>
+              <a:rPr sz="1400" dirty="0">
+                <a:solidFill>
+                  <a:srgbClr val="202020"/>
+                </a:solidFill>
+                <a:latin typeface="Roboto"/>
+                <a:cs typeface="Roboto"/>
+              </a:rPr>
+              <a:t> </a:t>
+            </a:r>
+            <a:r>
+              <a:rPr sz="1400" spc="-15" dirty="0">
+                <a:solidFill>
+                  <a:srgbClr val="202020"/>
+                </a:solidFill>
+                <a:latin typeface="Roboto"/>
+                <a:cs typeface="Roboto"/>
+              </a:rPr>
+              <a:t>is</a:t>
+            </a:r>
+            <a:r>
+              <a:rPr sz="1400" dirty="0">
+                <a:solidFill>
+                  <a:srgbClr val="202020"/>
+                </a:solidFill>
+                <a:latin typeface="Roboto"/>
+                <a:cs typeface="Roboto"/>
+              </a:rPr>
+              <a:t> </a:t>
+            </a:r>
+            <a:r>
+              <a:rPr sz="1400" spc="-15" dirty="0">
+                <a:solidFill>
+                  <a:srgbClr val="202020"/>
+                </a:solidFill>
+                <a:latin typeface="Roboto"/>
+                <a:cs typeface="Roboto"/>
+              </a:rPr>
+              <a:t>mostly</a:t>
+            </a:r>
+            <a:r>
+              <a:rPr sz="1400" spc="-5" dirty="0">
+                <a:solidFill>
+                  <a:srgbClr val="202020"/>
+                </a:solidFill>
+                <a:latin typeface="Roboto"/>
+                <a:cs typeface="Roboto"/>
+              </a:rPr>
+              <a:t> </a:t>
+            </a:r>
+            <a:r>
+              <a:rPr sz="1400" spc="-10" dirty="0">
+                <a:solidFill>
+                  <a:srgbClr val="202020"/>
+                </a:solidFill>
+                <a:latin typeface="Roboto"/>
+                <a:cs typeface="Roboto"/>
+              </a:rPr>
+              <a:t>used</a:t>
+            </a:r>
+            <a:r>
+              <a:rPr sz="1400" spc="5" dirty="0">
+                <a:solidFill>
+                  <a:srgbClr val="202020"/>
+                </a:solidFill>
+                <a:latin typeface="Roboto"/>
+                <a:cs typeface="Roboto"/>
+              </a:rPr>
+              <a:t> </a:t>
+            </a:r>
+            <a:r>
+              <a:rPr sz="1400" spc="50" dirty="0">
+                <a:solidFill>
+                  <a:srgbClr val="202020"/>
+                </a:solidFill>
+                <a:latin typeface="Roboto"/>
+                <a:cs typeface="Roboto"/>
+              </a:rPr>
+              <a:t>foí</a:t>
+            </a:r>
+            <a:r>
+              <a:rPr sz="1400" spc="-5" dirty="0">
+                <a:solidFill>
+                  <a:srgbClr val="202020"/>
+                </a:solidFill>
+                <a:latin typeface="Roboto"/>
+                <a:cs typeface="Roboto"/>
+              </a:rPr>
+              <a:t> </a:t>
+            </a:r>
+            <a:r>
+              <a:rPr sz="1400" spc="10" dirty="0">
+                <a:solidFill>
+                  <a:srgbClr val="202020"/>
+                </a:solidFill>
+                <a:latin typeface="Roboto"/>
+                <a:cs typeface="Roboto"/>
+              </a:rPr>
+              <a:t>eaíly</a:t>
+            </a:r>
+            <a:r>
+              <a:rPr sz="1400" spc="-15" dirty="0">
+                <a:solidFill>
+                  <a:srgbClr val="202020"/>
+                </a:solidFill>
+                <a:latin typeface="Roboto"/>
+                <a:cs typeface="Roboto"/>
+              </a:rPr>
+              <a:t> </a:t>
+            </a:r>
+            <a:r>
+              <a:rPr sz="1400" spc="-10" dirty="0">
+                <a:solidFill>
+                  <a:srgbClr val="202020"/>
+                </a:solidFill>
+                <a:latin typeface="Roboto"/>
+                <a:cs typeface="Roboto"/>
+              </a:rPr>
+              <a:t>booking </a:t>
+            </a:r>
+            <a:r>
+              <a:rPr sz="1400" spc="10" dirty="0">
+                <a:solidFill>
+                  <a:srgbClr val="202020"/>
+                </a:solidFill>
+                <a:latin typeface="Roboto"/>
+                <a:cs typeface="Roboto"/>
+              </a:rPr>
+              <a:t>of</a:t>
+            </a:r>
+            <a:r>
+              <a:rPr sz="1400" spc="-5" dirty="0">
+                <a:solidFill>
+                  <a:srgbClr val="202020"/>
+                </a:solidFill>
+                <a:latin typeface="Roboto"/>
+                <a:cs typeface="Roboto"/>
+              </a:rPr>
+              <a:t> </a:t>
+            </a:r>
+            <a:r>
+              <a:rPr sz="1400" spc="-15" dirty="0">
+                <a:solidFill>
+                  <a:srgbClr val="202020"/>
+                </a:solidFill>
+                <a:latin typeface="Roboto"/>
+                <a:cs typeface="Roboto"/>
+              </a:rPr>
+              <a:t>hotels?</a:t>
+            </a:r>
+            <a:endParaRPr sz="1400">
+              <a:latin typeface="Roboto"/>
+              <a:cs typeface="Roboto"/>
+            </a:endParaRPr>
+          </a:p>
+          <a:p>
+            <a:pPr>
+              <a:lnSpc>
+                <a:spcPct val="100000"/>
+              </a:lnSpc>
+              <a:buFont typeface="Roboto"/>
+              <a:buAutoNum type="arabicParenBoth"/>
+            </a:pPr>
+            <a:endParaRPr sz="1400">
+              <a:latin typeface="Roboto"/>
+              <a:cs typeface="Roboto"/>
+            </a:endParaRPr>
+          </a:p>
+          <a:p>
+            <a:pPr marL="355600" indent="-343535">
+              <a:lnSpc>
+                <a:spcPct val="100000"/>
+              </a:lnSpc>
+              <a:buClr>
+                <a:srgbClr val="000000"/>
+              </a:buClr>
+              <a:buAutoNum type="arabicParenBoth"/>
+              <a:tabLst>
+                <a:tab pos="356235" algn="l"/>
+              </a:tabLst>
+            </a:pPr>
+            <a:r>
+              <a:rPr sz="1400" spc="-10" dirty="0">
+                <a:solidFill>
+                  <a:srgbClr val="202020"/>
+                </a:solidFill>
+                <a:latin typeface="Roboto"/>
+                <a:cs typeface="Roboto"/>
+              </a:rPr>
+              <a:t>Which</a:t>
+            </a:r>
+            <a:r>
+              <a:rPr sz="1400" spc="10" dirty="0">
+                <a:solidFill>
+                  <a:srgbClr val="202020"/>
+                </a:solidFill>
+                <a:latin typeface="Roboto"/>
+                <a:cs typeface="Roboto"/>
+              </a:rPr>
+              <a:t> </a:t>
+            </a:r>
+            <a:r>
+              <a:rPr sz="1400" spc="-5" dirty="0">
+                <a:solidFill>
+                  <a:srgbClr val="202020"/>
+                </a:solidFill>
+                <a:latin typeface="Roboto"/>
+                <a:cs typeface="Roboto"/>
+              </a:rPr>
+              <a:t>distíibution</a:t>
+            </a:r>
+            <a:r>
+              <a:rPr sz="1400" spc="15" dirty="0">
+                <a:solidFill>
+                  <a:srgbClr val="202020"/>
+                </a:solidFill>
+                <a:latin typeface="Roboto"/>
+                <a:cs typeface="Roboto"/>
+              </a:rPr>
+              <a:t> </a:t>
+            </a:r>
+            <a:r>
+              <a:rPr sz="1400" spc="-15" dirty="0">
+                <a:solidFill>
+                  <a:srgbClr val="202020"/>
+                </a:solidFill>
+                <a:latin typeface="Roboto"/>
+                <a:cs typeface="Roboto"/>
+              </a:rPr>
+              <a:t>channel</a:t>
+            </a:r>
+            <a:r>
+              <a:rPr sz="1400" spc="-10" dirty="0">
+                <a:solidFill>
+                  <a:srgbClr val="202020"/>
+                </a:solidFill>
+                <a:latin typeface="Roboto"/>
+                <a:cs typeface="Roboto"/>
+              </a:rPr>
+              <a:t> </a:t>
+            </a:r>
+            <a:r>
+              <a:rPr sz="1400" spc="10" dirty="0">
+                <a:solidFill>
+                  <a:srgbClr val="202020"/>
+                </a:solidFill>
+                <a:latin typeface="Roboto"/>
+                <a:cs typeface="Roboto"/>
+              </a:rPr>
+              <a:t>bíings</a:t>
+            </a:r>
+            <a:r>
+              <a:rPr sz="1400" spc="-5" dirty="0">
+                <a:solidFill>
+                  <a:srgbClr val="202020"/>
+                </a:solidFill>
+                <a:latin typeface="Roboto"/>
+                <a:cs typeface="Roboto"/>
+              </a:rPr>
+              <a:t> </a:t>
+            </a:r>
+            <a:r>
+              <a:rPr sz="1400" spc="15" dirty="0">
+                <a:solidFill>
+                  <a:srgbClr val="202020"/>
+                </a:solidFill>
+                <a:latin typeface="Roboto"/>
+                <a:cs typeface="Roboto"/>
+              </a:rPr>
+              <a:t>betteí </a:t>
+            </a:r>
+            <a:r>
+              <a:rPr sz="1400" spc="10" dirty="0">
+                <a:solidFill>
+                  <a:srgbClr val="202020"/>
+                </a:solidFill>
+                <a:latin typeface="Roboto"/>
+                <a:cs typeface="Roboto"/>
+              </a:rPr>
+              <a:t>íevenue</a:t>
+            </a:r>
+            <a:r>
+              <a:rPr sz="1400" spc="-40" dirty="0">
+                <a:solidFill>
+                  <a:srgbClr val="202020"/>
+                </a:solidFill>
+                <a:latin typeface="Roboto"/>
+                <a:cs typeface="Roboto"/>
+              </a:rPr>
+              <a:t> </a:t>
+            </a:r>
+            <a:r>
+              <a:rPr sz="1400" dirty="0">
+                <a:solidFill>
+                  <a:srgbClr val="202020"/>
+                </a:solidFill>
+                <a:latin typeface="Roboto"/>
+                <a:cs typeface="Roboto"/>
+              </a:rPr>
+              <a:t>geneíating</a:t>
+            </a:r>
+            <a:r>
+              <a:rPr sz="1400" spc="-10" dirty="0">
+                <a:solidFill>
+                  <a:srgbClr val="202020"/>
+                </a:solidFill>
+                <a:latin typeface="Roboto"/>
+                <a:cs typeface="Roboto"/>
+              </a:rPr>
+              <a:t> deals </a:t>
+            </a:r>
+            <a:r>
+              <a:rPr sz="1400" spc="50" dirty="0">
+                <a:solidFill>
+                  <a:srgbClr val="202020"/>
+                </a:solidFill>
+                <a:latin typeface="Roboto"/>
+                <a:cs typeface="Roboto"/>
+              </a:rPr>
+              <a:t>foí</a:t>
+            </a:r>
+            <a:r>
+              <a:rPr sz="1400" dirty="0">
+                <a:solidFill>
+                  <a:srgbClr val="202020"/>
+                </a:solidFill>
+                <a:latin typeface="Roboto"/>
+                <a:cs typeface="Roboto"/>
+              </a:rPr>
+              <a:t> </a:t>
+            </a:r>
+            <a:r>
+              <a:rPr sz="1400" spc="-15" dirty="0">
+                <a:solidFill>
+                  <a:srgbClr val="202020"/>
+                </a:solidFill>
+                <a:latin typeface="Roboto"/>
+                <a:cs typeface="Roboto"/>
+              </a:rPr>
+              <a:t>hotels?</a:t>
+            </a:r>
+            <a:endParaRPr sz="1400">
+              <a:latin typeface="Roboto"/>
+              <a:cs typeface="Roboto"/>
+            </a:endParaRPr>
+          </a:p>
+        </p:txBody>
+      </p:sp>
+    </p:spTree>
+  </p:cSld>
+  <p:clrMapOvr>
+    <a:masterClrMapping/>
+  </p:clrMapOvr>
+</p:sld>
+</file>
+
+<file path=ppt/slides/slide21.xml><?xml version="1.0" encoding="utf-8"?>
 <p:sld xmlns:a="http://schemas.openxmlformats.org/drawingml/2006/main" xmlns:r="http://schemas.openxmlformats.org/officeDocument/2006/relationships" xmlns:p="http://schemas.openxmlformats.org/presentationml/2006/main">
   <p:cSld>
     <p:spTree>
@@ -9657,7 +9859,7 @@
 </p:sld>
 </file>
 
-<file path=ppt/slides/slide21.xml><?xml version="1.0" encoding="utf-8"?>
+<file path=ppt/slides/slide22.xml><?xml version="1.0" encoding="utf-8"?>
 <p:sld xmlns:a="http://schemas.openxmlformats.org/drawingml/2006/main" xmlns:r="http://schemas.openxmlformats.org/officeDocument/2006/relationships" xmlns:p="http://schemas.openxmlformats.org/presentationml/2006/main">
   <p:cSld>
     <p:spTree>
@@ -10856,7 +11058,7 @@
 </p:sld>
 </file>
 
-<file path=ppt/slides/slide22.xml><?xml version="1.0" encoding="utf-8"?>
+<file path=ppt/slides/slide23.xml><?xml version="1.0" encoding="utf-8"?>
 <p:sld xmlns:a="http://schemas.openxmlformats.org/drawingml/2006/main" xmlns:r="http://schemas.openxmlformats.org/officeDocument/2006/relationships" xmlns:p="http://schemas.openxmlformats.org/presentationml/2006/main">
   <p:cSld>
     <p:spTree>
@@ -11693,7 +11895,7 @@
 </p:sld>
 </file>
 
-<file path=ppt/slides/slide23.xml><?xml version="1.0" encoding="utf-8"?>
+<file path=ppt/slides/slide24.xml><?xml version="1.0" encoding="utf-8"?>
 <p:sld xmlns:a="http://schemas.openxmlformats.org/drawingml/2006/main" xmlns:r="http://schemas.openxmlformats.org/officeDocument/2006/relationships" xmlns:p="http://schemas.openxmlformats.org/presentationml/2006/main">
   <p:cSld>
     <p:spTree>
@@ -12719,7 +12921,7 @@
 </p:sld>
 </file>
 
-<file path=ppt/slides/slide24.xml><?xml version="1.0" encoding="utf-8"?>
+<file path=ppt/slides/slide25.xml><?xml version="1.0" encoding="utf-8"?>
 <p:sld xmlns:a="http://schemas.openxmlformats.org/drawingml/2006/main" xmlns:r="http://schemas.openxmlformats.org/officeDocument/2006/relationships" xmlns:p="http://schemas.openxmlformats.org/presentationml/2006/main">
   <p:cSld>
     <p:spTree>
@@ -14100,7 +14302,7 @@
 </p:sld>
 </file>
 
-<file path=ppt/slides/slide25.xml><?xml version="1.0" encoding="utf-8"?>
+<file path=ppt/slides/slide26.xml><?xml version="1.0" encoding="utf-8"?>
 <p:sld xmlns:a="http://schemas.openxmlformats.org/drawingml/2006/main" xmlns:r="http://schemas.openxmlformats.org/officeDocument/2006/relationships" xmlns:p="http://schemas.openxmlformats.org/presentationml/2006/main">
   <p:cSld>
     <p:spTree>
@@ -14927,7 +15129,7 @@
 </p:sld>
 </file>
 
-<file path=ppt/slides/slide26.xml><?xml version="1.0" encoding="utf-8"?>
+<file path=ppt/slides/slide27.xml><?xml version="1.0" encoding="utf-8"?>
 <p:sld xmlns:a="http://schemas.openxmlformats.org/drawingml/2006/main" xmlns:r="http://schemas.openxmlformats.org/officeDocument/2006/relationships" xmlns:p="http://schemas.openxmlformats.org/presentationml/2006/main">
   <p:cSld>
     <p:spTree>
@@ -15370,7 +15572,7 @@
 </p:sld>
 </file>
 
-<file path=ppt/slides/slide27.xml><?xml version="1.0" encoding="utf-8"?>
+<file path=ppt/slides/slide28.xml><?xml version="1.0" encoding="utf-8"?>
 <p:sld xmlns:a="http://schemas.openxmlformats.org/drawingml/2006/main" xmlns:r="http://schemas.openxmlformats.org/officeDocument/2006/relationships" xmlns:p="http://schemas.openxmlformats.org/presentationml/2006/main">
   <p:cSld>
     <p:spTree>
@@ -15914,7 +16116,7 @@
 </p:sld>
 </file>
 
-<file path=ppt/slides/slide28.xml><?xml version="1.0" encoding="utf-8"?>
+<file path=ppt/slides/slide29.xml><?xml version="1.0" encoding="utf-8"?>
 <p:sld xmlns:a="http://schemas.openxmlformats.org/drawingml/2006/main" xmlns:r="http://schemas.openxmlformats.org/officeDocument/2006/relationships" xmlns:p="http://schemas.openxmlformats.org/presentationml/2006/main">
   <p:cSld>
     <p:spTree>
@@ -16781,7 +16983,965 @@
 </p:sld>
 </file>
 
-<file path=ppt/slides/slide29.xml><?xml version="1.0" encoding="utf-8"?>
+<file path=ppt/slides/slide3.xml><?xml version="1.0" encoding="utf-8"?>
+<p:sld xmlns:a="http://schemas.openxmlformats.org/drawingml/2006/main" xmlns:r="http://schemas.openxmlformats.org/officeDocument/2006/relationships" xmlns:p="http://schemas.openxmlformats.org/presentationml/2006/main">
+  <p:cSld>
+    <p:spTree>
+      <p:nvGrpSpPr>
+        <p:cNvPr id="1" name=""/>
+        <p:cNvGrpSpPr/>
+        <p:nvPr/>
+      </p:nvGrpSpPr>
+      <p:grpSpPr>
+        <a:xfrm>
+          <a:off x="0" y="0"/>
+          <a:ext cx="0" cy="0"/>
+          <a:chOff x="0" y="0"/>
+          <a:chExt cx="0" cy="0"/>
+        </a:xfrm>
+      </p:grpSpPr>
+      <p:sp>
+        <p:nvSpPr>
+          <p:cNvPr id="2" name="object 2"/>
+          <p:cNvSpPr txBox="1">
+            <a:spLocks noGrp="1"/>
+          </p:cNvSpPr>
+          <p:nvPr>
+            <p:ph type="title"/>
+          </p:nvPr>
+        </p:nvSpPr>
+        <p:spPr>
+          <a:xfrm>
+            <a:off x="3462273" y="400558"/>
+            <a:ext cx="1423670" cy="482600"/>
+          </a:xfrm>
+          <a:prstGeom prst="rect">
+            <a:avLst/>
+          </a:prstGeom>
+        </p:spPr>
+        <p:txBody>
+          <a:bodyPr vert="horz" wrap="square" lIns="0" tIns="12700" rIns="0" bIns="0" rtlCol="0">
+            <a:spAutoFit/>
+          </a:bodyPr>
+          <a:lstStyle/>
+          <a:p>
+            <a:pPr marL="12700">
+              <a:lnSpc>
+                <a:spcPct val="100000"/>
+              </a:lnSpc>
+              <a:spcBef>
+                <a:spcPts val="100"/>
+              </a:spcBef>
+            </a:pPr>
+            <a:r>
+              <a:rPr sz="3000" dirty="0"/>
+              <a:t>A</a:t>
+            </a:r>
+            <a:r>
+              <a:rPr sz="3000" spc="5" dirty="0"/>
+              <a:t>g</a:t>
+            </a:r>
+            <a:r>
+              <a:rPr sz="3000" dirty="0"/>
+              <a:t>enda</a:t>
+            </a:r>
+            <a:endParaRPr sz="3000"/>
+          </a:p>
+        </p:txBody>
+      </p:sp>
+      <p:sp>
+        <p:nvSpPr>
+          <p:cNvPr id="3" name="object 3"/>
+          <p:cNvSpPr txBox="1"/>
+          <p:nvPr/>
+        </p:nvSpPr>
+        <p:spPr>
+          <a:xfrm>
+            <a:off x="790143" y="1309827"/>
+            <a:ext cx="6066155" cy="3441065"/>
+          </a:xfrm>
+          <a:prstGeom prst="rect">
+            <a:avLst/>
+          </a:prstGeom>
+        </p:spPr>
+        <p:txBody>
+          <a:bodyPr vert="horz" wrap="square" lIns="0" tIns="13335" rIns="0" bIns="0" rtlCol="0">
+            <a:spAutoFit/>
+          </a:bodyPr>
+          <a:lstStyle/>
+          <a:p>
+            <a:pPr marL="12700">
+              <a:lnSpc>
+                <a:spcPct val="100000"/>
+              </a:lnSpc>
+              <a:spcBef>
+                <a:spcPts val="105"/>
+              </a:spcBef>
+            </a:pPr>
+            <a:r>
+              <a:rPr sz="1400" spc="-5" dirty="0">
+                <a:latin typeface="Arial MT"/>
+                <a:cs typeface="Arial MT"/>
+              </a:rPr>
+              <a:t>To </a:t>
+            </a:r>
+            <a:r>
+              <a:rPr sz="1400" dirty="0">
+                <a:latin typeface="Arial MT"/>
+                <a:cs typeface="Arial MT"/>
+              </a:rPr>
+              <a:t>discuss</a:t>
+            </a:r>
+            <a:r>
+              <a:rPr sz="1400" spc="-25" dirty="0">
+                <a:latin typeface="Arial MT"/>
+                <a:cs typeface="Arial MT"/>
+              </a:rPr>
+              <a:t> </a:t>
+            </a:r>
+            <a:r>
+              <a:rPr sz="1400" dirty="0">
+                <a:latin typeface="Arial MT"/>
+                <a:cs typeface="Arial MT"/>
+              </a:rPr>
+              <a:t>the</a:t>
+            </a:r>
+            <a:r>
+              <a:rPr sz="1400" spc="-30" dirty="0">
+                <a:latin typeface="Arial MT"/>
+                <a:cs typeface="Arial MT"/>
+              </a:rPr>
+              <a:t> </a:t>
+            </a:r>
+            <a:r>
+              <a:rPr sz="1400" spc="-5" dirty="0">
+                <a:latin typeface="Arial MT"/>
+                <a:cs typeface="Arial MT"/>
+              </a:rPr>
+              <a:t>analysis </a:t>
+            </a:r>
+            <a:r>
+              <a:rPr sz="1400" dirty="0">
+                <a:latin typeface="Arial MT"/>
+                <a:cs typeface="Arial MT"/>
+              </a:rPr>
+              <a:t>of</a:t>
+            </a:r>
+            <a:r>
+              <a:rPr sz="1400" spc="5" dirty="0">
+                <a:latin typeface="Arial MT"/>
+                <a:cs typeface="Arial MT"/>
+              </a:rPr>
+              <a:t> </a:t>
+            </a:r>
+            <a:r>
+              <a:rPr sz="1400" spc="-5" dirty="0">
+                <a:latin typeface="Arial MT"/>
+                <a:cs typeface="Arial MT"/>
+              </a:rPr>
+              <a:t>given</a:t>
+            </a:r>
+            <a:r>
+              <a:rPr sz="1400" spc="5" dirty="0">
+                <a:latin typeface="Arial MT"/>
+                <a:cs typeface="Arial MT"/>
+              </a:rPr>
+              <a:t> </a:t>
+            </a:r>
+            <a:r>
+              <a:rPr sz="1400" dirty="0">
+                <a:latin typeface="Arial MT"/>
+                <a:cs typeface="Arial MT"/>
+              </a:rPr>
+              <a:t>hotel</a:t>
+            </a:r>
+            <a:r>
+              <a:rPr sz="1400" spc="-30" dirty="0">
+                <a:latin typeface="Arial MT"/>
+                <a:cs typeface="Arial MT"/>
+              </a:rPr>
+              <a:t> </a:t>
+            </a:r>
+            <a:r>
+              <a:rPr sz="1400" dirty="0">
+                <a:latin typeface="Arial MT"/>
+                <a:cs typeface="Arial MT"/>
+              </a:rPr>
+              <a:t>bookings</a:t>
+            </a:r>
+            <a:r>
+              <a:rPr sz="1400" spc="-35" dirty="0">
+                <a:latin typeface="Arial MT"/>
+                <a:cs typeface="Arial MT"/>
+              </a:rPr>
+              <a:t> </a:t>
+            </a:r>
+            <a:r>
+              <a:rPr sz="1400" dirty="0">
+                <a:latin typeface="Arial MT"/>
+                <a:cs typeface="Arial MT"/>
+              </a:rPr>
+              <a:t>data</a:t>
+            </a:r>
+            <a:r>
+              <a:rPr sz="1400" spc="-10" dirty="0">
+                <a:latin typeface="Arial MT"/>
+                <a:cs typeface="Arial MT"/>
+              </a:rPr>
+              <a:t> </a:t>
+            </a:r>
+            <a:r>
+              <a:rPr sz="1400" dirty="0">
+                <a:latin typeface="Arial MT"/>
+                <a:cs typeface="Arial MT"/>
+              </a:rPr>
+              <a:t>set</a:t>
+            </a:r>
+            <a:r>
+              <a:rPr sz="1400" spc="-20" dirty="0">
+                <a:latin typeface="Arial MT"/>
+                <a:cs typeface="Arial MT"/>
+              </a:rPr>
+              <a:t> </a:t>
+            </a:r>
+            <a:r>
+              <a:rPr sz="1400" dirty="0">
+                <a:latin typeface="Arial MT"/>
+                <a:cs typeface="Arial MT"/>
+              </a:rPr>
+              <a:t>from</a:t>
+            </a:r>
+            <a:r>
+              <a:rPr sz="1400" spc="-20" dirty="0">
+                <a:latin typeface="Arial MT"/>
+                <a:cs typeface="Arial MT"/>
+              </a:rPr>
+              <a:t> </a:t>
+            </a:r>
+            <a:r>
+              <a:rPr sz="1400" spc="-5" dirty="0">
+                <a:latin typeface="Arial MT"/>
+                <a:cs typeface="Arial MT"/>
+              </a:rPr>
+              <a:t>2015-2017.</a:t>
+            </a:r>
+            <a:endParaRPr sz="1400">
+              <a:latin typeface="Arial MT"/>
+              <a:cs typeface="Arial MT"/>
+            </a:endParaRPr>
+          </a:p>
+          <a:p>
+            <a:pPr>
+              <a:lnSpc>
+                <a:spcPct val="100000"/>
+              </a:lnSpc>
+              <a:spcBef>
+                <a:spcPts val="15"/>
+              </a:spcBef>
+            </a:pPr>
+            <a:endParaRPr sz="1450">
+              <a:latin typeface="Arial MT"/>
+              <a:cs typeface="Arial MT"/>
+            </a:endParaRPr>
+          </a:p>
+          <a:p>
+            <a:pPr marL="12700">
+              <a:lnSpc>
+                <a:spcPct val="100000"/>
+              </a:lnSpc>
+            </a:pPr>
+            <a:r>
+              <a:rPr sz="1400" dirty="0">
+                <a:latin typeface="Arial MT"/>
+                <a:cs typeface="Arial MT"/>
+              </a:rPr>
+              <a:t>We’ll</a:t>
+            </a:r>
+            <a:r>
+              <a:rPr sz="1400" spc="-30" dirty="0">
+                <a:latin typeface="Arial MT"/>
+                <a:cs typeface="Arial MT"/>
+              </a:rPr>
+              <a:t> </a:t>
+            </a:r>
+            <a:r>
+              <a:rPr sz="1400" spc="-5" dirty="0">
+                <a:latin typeface="Arial MT"/>
+                <a:cs typeface="Arial MT"/>
+              </a:rPr>
+              <a:t>be</a:t>
+            </a:r>
+            <a:r>
+              <a:rPr sz="1400" spc="-10" dirty="0">
+                <a:latin typeface="Arial MT"/>
+                <a:cs typeface="Arial MT"/>
+              </a:rPr>
+              <a:t> </a:t>
+            </a:r>
+            <a:r>
+              <a:rPr sz="1400" spc="-5" dirty="0">
+                <a:latin typeface="Arial MT"/>
+                <a:cs typeface="Arial MT"/>
+              </a:rPr>
+              <a:t>doing</a:t>
+            </a:r>
+            <a:r>
+              <a:rPr sz="1400" spc="-25" dirty="0">
+                <a:latin typeface="Arial MT"/>
+                <a:cs typeface="Arial MT"/>
+              </a:rPr>
+              <a:t> </a:t>
+            </a:r>
+            <a:r>
+              <a:rPr sz="1400" spc="-5" dirty="0">
+                <a:latin typeface="Arial MT"/>
+                <a:cs typeface="Arial MT"/>
+              </a:rPr>
+              <a:t>analysis</a:t>
+            </a:r>
+            <a:r>
+              <a:rPr sz="1400" spc="-10" dirty="0">
+                <a:latin typeface="Arial MT"/>
+                <a:cs typeface="Arial MT"/>
+              </a:rPr>
+              <a:t> </a:t>
+            </a:r>
+            <a:r>
+              <a:rPr sz="1400" spc="-5" dirty="0">
+                <a:latin typeface="Arial MT"/>
+                <a:cs typeface="Arial MT"/>
+              </a:rPr>
+              <a:t>of</a:t>
+            </a:r>
+            <a:r>
+              <a:rPr sz="1400" spc="-15" dirty="0">
+                <a:latin typeface="Arial MT"/>
+                <a:cs typeface="Arial MT"/>
+              </a:rPr>
+              <a:t> </a:t>
+            </a:r>
+            <a:r>
+              <a:rPr sz="1400" spc="-10" dirty="0">
+                <a:latin typeface="Arial MT"/>
+                <a:cs typeface="Arial MT"/>
+              </a:rPr>
+              <a:t>given </a:t>
+            </a:r>
+            <a:r>
+              <a:rPr sz="1400" spc="-5" dirty="0">
+                <a:latin typeface="Arial MT"/>
+                <a:cs typeface="Arial MT"/>
+              </a:rPr>
+              <a:t>data</a:t>
+            </a:r>
+            <a:r>
+              <a:rPr sz="1400" spc="-20" dirty="0">
+                <a:latin typeface="Arial MT"/>
+                <a:cs typeface="Arial MT"/>
+              </a:rPr>
+              <a:t> </a:t>
+            </a:r>
+            <a:r>
+              <a:rPr sz="1400" dirty="0">
+                <a:latin typeface="Arial MT"/>
+                <a:cs typeface="Arial MT"/>
+              </a:rPr>
+              <a:t>set</a:t>
+            </a:r>
+            <a:r>
+              <a:rPr sz="1400" spc="-25" dirty="0">
+                <a:latin typeface="Arial MT"/>
+                <a:cs typeface="Arial MT"/>
+              </a:rPr>
+              <a:t> </a:t>
+            </a:r>
+            <a:r>
+              <a:rPr sz="1400" spc="-5" dirty="0">
+                <a:latin typeface="Arial MT"/>
+                <a:cs typeface="Arial MT"/>
+              </a:rPr>
+              <a:t>in</a:t>
+            </a:r>
+            <a:r>
+              <a:rPr sz="1400" spc="-10" dirty="0">
+                <a:latin typeface="Arial MT"/>
+                <a:cs typeface="Arial MT"/>
+              </a:rPr>
+              <a:t> </a:t>
+            </a:r>
+            <a:r>
+              <a:rPr sz="1400" spc="-5" dirty="0">
+                <a:latin typeface="Arial MT"/>
+                <a:cs typeface="Arial MT"/>
+              </a:rPr>
+              <a:t>following</a:t>
+            </a:r>
+            <a:r>
+              <a:rPr sz="1400" spc="-20" dirty="0">
+                <a:latin typeface="Arial MT"/>
+                <a:cs typeface="Arial MT"/>
+              </a:rPr>
+              <a:t> </a:t>
+            </a:r>
+            <a:r>
+              <a:rPr sz="1400" spc="-10" dirty="0">
+                <a:latin typeface="Arial MT"/>
+                <a:cs typeface="Arial MT"/>
+              </a:rPr>
+              <a:t>ways</a:t>
+            </a:r>
+            <a:r>
+              <a:rPr sz="1400" spc="50" dirty="0">
+                <a:latin typeface="Arial MT"/>
+                <a:cs typeface="Arial MT"/>
+              </a:rPr>
+              <a:t> </a:t>
+            </a:r>
+            <a:r>
+              <a:rPr sz="1400" dirty="0">
+                <a:latin typeface="Arial MT"/>
+                <a:cs typeface="Arial MT"/>
+              </a:rPr>
+              <a:t>:</a:t>
+            </a:r>
+            <a:endParaRPr sz="1400">
+              <a:latin typeface="Arial MT"/>
+              <a:cs typeface="Arial MT"/>
+            </a:endParaRPr>
+          </a:p>
+          <a:p>
+            <a:pPr marL="299085" indent="-287020">
+              <a:lnSpc>
+                <a:spcPct val="100000"/>
+              </a:lnSpc>
+              <a:spcBef>
+                <a:spcPts val="1165"/>
+              </a:spcBef>
+              <a:buChar char="•"/>
+              <a:tabLst>
+                <a:tab pos="299085" algn="l"/>
+                <a:tab pos="299720" algn="l"/>
+              </a:tabLst>
+            </a:pPr>
+            <a:r>
+              <a:rPr sz="1400" spc="-5" dirty="0">
+                <a:latin typeface="Arial MT"/>
+                <a:cs typeface="Arial MT"/>
+              </a:rPr>
+              <a:t>Univariate</a:t>
+            </a:r>
+            <a:r>
+              <a:rPr sz="1400" spc="-50" dirty="0">
+                <a:latin typeface="Arial MT"/>
+                <a:cs typeface="Arial MT"/>
+              </a:rPr>
+              <a:t> </a:t>
+            </a:r>
+            <a:r>
+              <a:rPr sz="1400" spc="-5" dirty="0">
+                <a:latin typeface="Arial MT"/>
+                <a:cs typeface="Arial MT"/>
+              </a:rPr>
+              <a:t>analysis</a:t>
+            </a:r>
+            <a:endParaRPr sz="1400">
+              <a:latin typeface="Arial MT"/>
+              <a:cs typeface="Arial MT"/>
+            </a:endParaRPr>
+          </a:p>
+          <a:p>
+            <a:pPr>
+              <a:lnSpc>
+                <a:spcPct val="100000"/>
+              </a:lnSpc>
+              <a:spcBef>
+                <a:spcPts val="10"/>
+              </a:spcBef>
+              <a:buFont typeface="Arial MT"/>
+              <a:buChar char="•"/>
+            </a:pPr>
+            <a:endParaRPr sz="1450">
+              <a:latin typeface="Arial MT"/>
+              <a:cs typeface="Arial MT"/>
+            </a:endParaRPr>
+          </a:p>
+          <a:p>
+            <a:pPr marL="299085" indent="-287020">
+              <a:lnSpc>
+                <a:spcPct val="100000"/>
+              </a:lnSpc>
+              <a:buChar char="•"/>
+              <a:tabLst>
+                <a:tab pos="299085" algn="l"/>
+                <a:tab pos="299720" algn="l"/>
+              </a:tabLst>
+            </a:pPr>
+            <a:r>
+              <a:rPr sz="1400" dirty="0">
+                <a:latin typeface="Arial MT"/>
+                <a:cs typeface="Arial MT"/>
+              </a:rPr>
+              <a:t>Hotel</a:t>
+            </a:r>
+            <a:r>
+              <a:rPr sz="1400" spc="-45" dirty="0">
+                <a:latin typeface="Arial MT"/>
+                <a:cs typeface="Arial MT"/>
+              </a:rPr>
+              <a:t> </a:t>
+            </a:r>
+            <a:r>
+              <a:rPr sz="1400" spc="-5" dirty="0">
+                <a:latin typeface="Arial MT"/>
+                <a:cs typeface="Arial MT"/>
+              </a:rPr>
+              <a:t>wise</a:t>
+            </a:r>
+            <a:r>
+              <a:rPr sz="1400" spc="-25" dirty="0">
+                <a:latin typeface="Arial MT"/>
+                <a:cs typeface="Arial MT"/>
+              </a:rPr>
+              <a:t> </a:t>
+            </a:r>
+            <a:r>
+              <a:rPr sz="1400" spc="-5" dirty="0">
+                <a:latin typeface="Arial MT"/>
+                <a:cs typeface="Arial MT"/>
+              </a:rPr>
+              <a:t>analysis</a:t>
+            </a:r>
+            <a:endParaRPr sz="1400">
+              <a:latin typeface="Arial MT"/>
+              <a:cs typeface="Arial MT"/>
+            </a:endParaRPr>
+          </a:p>
+          <a:p>
+            <a:pPr>
+              <a:lnSpc>
+                <a:spcPct val="100000"/>
+              </a:lnSpc>
+              <a:spcBef>
+                <a:spcPts val="15"/>
+              </a:spcBef>
+              <a:buFont typeface="Arial MT"/>
+              <a:buChar char="•"/>
+            </a:pPr>
+            <a:endParaRPr sz="1450">
+              <a:latin typeface="Arial MT"/>
+              <a:cs typeface="Arial MT"/>
+            </a:endParaRPr>
+          </a:p>
+          <a:p>
+            <a:pPr marL="299085" indent="-287020">
+              <a:lnSpc>
+                <a:spcPct val="100000"/>
+              </a:lnSpc>
+              <a:buChar char="•"/>
+              <a:tabLst>
+                <a:tab pos="299085" algn="l"/>
+                <a:tab pos="299720" algn="l"/>
+              </a:tabLst>
+            </a:pPr>
+            <a:r>
+              <a:rPr sz="1400" dirty="0">
+                <a:latin typeface="Arial MT"/>
+                <a:cs typeface="Arial MT"/>
+              </a:rPr>
+              <a:t>Distribution</a:t>
+            </a:r>
+            <a:r>
+              <a:rPr sz="1400" spc="-60" dirty="0">
+                <a:latin typeface="Arial MT"/>
+                <a:cs typeface="Arial MT"/>
+              </a:rPr>
+              <a:t> </a:t>
+            </a:r>
+            <a:r>
+              <a:rPr sz="1400" dirty="0">
+                <a:latin typeface="Arial MT"/>
+                <a:cs typeface="Arial MT"/>
+              </a:rPr>
+              <a:t>Channel</a:t>
+            </a:r>
+            <a:r>
+              <a:rPr sz="1400" spc="-45" dirty="0">
+                <a:latin typeface="Arial MT"/>
+                <a:cs typeface="Arial MT"/>
+              </a:rPr>
+              <a:t> </a:t>
+            </a:r>
+            <a:r>
+              <a:rPr sz="1400" spc="-5" dirty="0">
+                <a:latin typeface="Arial MT"/>
+                <a:cs typeface="Arial MT"/>
+              </a:rPr>
+              <a:t>wise analysis</a:t>
+            </a:r>
+            <a:endParaRPr sz="1400">
+              <a:latin typeface="Arial MT"/>
+              <a:cs typeface="Arial MT"/>
+            </a:endParaRPr>
+          </a:p>
+          <a:p>
+            <a:pPr>
+              <a:lnSpc>
+                <a:spcPct val="100000"/>
+              </a:lnSpc>
+              <a:spcBef>
+                <a:spcPts val="15"/>
+              </a:spcBef>
+              <a:buFont typeface="Arial MT"/>
+              <a:buChar char="•"/>
+            </a:pPr>
+            <a:endParaRPr sz="1450">
+              <a:latin typeface="Arial MT"/>
+              <a:cs typeface="Arial MT"/>
+            </a:endParaRPr>
+          </a:p>
+          <a:p>
+            <a:pPr marL="299085" indent="-287020">
+              <a:lnSpc>
+                <a:spcPct val="100000"/>
+              </a:lnSpc>
+              <a:buChar char="•"/>
+              <a:tabLst>
+                <a:tab pos="299085" algn="l"/>
+                <a:tab pos="299720" algn="l"/>
+              </a:tabLst>
+            </a:pPr>
+            <a:r>
+              <a:rPr sz="1400" dirty="0">
+                <a:latin typeface="Arial MT"/>
+                <a:cs typeface="Arial MT"/>
+              </a:rPr>
+              <a:t>Booking</a:t>
+            </a:r>
+            <a:r>
+              <a:rPr sz="1400" spc="-45" dirty="0">
+                <a:latin typeface="Arial MT"/>
+                <a:cs typeface="Arial MT"/>
+              </a:rPr>
+              <a:t> </a:t>
+            </a:r>
+            <a:r>
+              <a:rPr sz="1400" dirty="0">
+                <a:latin typeface="Arial MT"/>
+                <a:cs typeface="Arial MT"/>
+              </a:rPr>
+              <a:t>cancellation</a:t>
+            </a:r>
+            <a:r>
+              <a:rPr sz="1400" spc="-60" dirty="0">
+                <a:latin typeface="Arial MT"/>
+                <a:cs typeface="Arial MT"/>
+              </a:rPr>
+              <a:t> </a:t>
+            </a:r>
+            <a:r>
+              <a:rPr sz="1400" spc="-5" dirty="0">
+                <a:latin typeface="Arial MT"/>
+                <a:cs typeface="Arial MT"/>
+              </a:rPr>
+              <a:t>analysis</a:t>
+            </a:r>
+            <a:endParaRPr sz="1400">
+              <a:latin typeface="Arial MT"/>
+              <a:cs typeface="Arial MT"/>
+            </a:endParaRPr>
+          </a:p>
+          <a:p>
+            <a:pPr>
+              <a:lnSpc>
+                <a:spcPct val="100000"/>
+              </a:lnSpc>
+              <a:spcBef>
+                <a:spcPts val="15"/>
+              </a:spcBef>
+              <a:buFont typeface="Arial MT"/>
+              <a:buChar char="•"/>
+            </a:pPr>
+            <a:endParaRPr sz="1450">
+              <a:latin typeface="Arial MT"/>
+              <a:cs typeface="Arial MT"/>
+            </a:endParaRPr>
+          </a:p>
+          <a:p>
+            <a:pPr marL="299085" indent="-287020">
+              <a:lnSpc>
+                <a:spcPct val="100000"/>
+              </a:lnSpc>
+              <a:buChar char="•"/>
+              <a:tabLst>
+                <a:tab pos="299085" algn="l"/>
+                <a:tab pos="299720" algn="l"/>
+              </a:tabLst>
+            </a:pPr>
+            <a:r>
+              <a:rPr sz="1400" spc="-5" dirty="0">
+                <a:latin typeface="Arial MT"/>
+                <a:cs typeface="Arial MT"/>
+              </a:rPr>
+              <a:t>Timewise</a:t>
+            </a:r>
+            <a:r>
+              <a:rPr sz="1400" spc="-35" dirty="0">
+                <a:latin typeface="Arial MT"/>
+                <a:cs typeface="Arial MT"/>
+              </a:rPr>
+              <a:t> </a:t>
+            </a:r>
+            <a:r>
+              <a:rPr sz="1400" spc="-5" dirty="0">
+                <a:latin typeface="Arial MT"/>
+                <a:cs typeface="Arial MT"/>
+              </a:rPr>
+              <a:t>analysis</a:t>
+            </a:r>
+            <a:endParaRPr sz="1400">
+              <a:latin typeface="Arial MT"/>
+              <a:cs typeface="Arial MT"/>
+            </a:endParaRPr>
+          </a:p>
+          <a:p>
+            <a:pPr>
+              <a:lnSpc>
+                <a:spcPct val="100000"/>
+              </a:lnSpc>
+            </a:pPr>
+            <a:endParaRPr sz="1500">
+              <a:latin typeface="Arial MT"/>
+              <a:cs typeface="Arial MT"/>
+            </a:endParaRPr>
+          </a:p>
+          <a:p>
+            <a:pPr>
+              <a:lnSpc>
+                <a:spcPct val="100000"/>
+              </a:lnSpc>
+              <a:spcBef>
+                <a:spcPts val="20"/>
+              </a:spcBef>
+            </a:pPr>
+            <a:endParaRPr sz="1850">
+              <a:latin typeface="Arial MT"/>
+              <a:cs typeface="Arial MT"/>
+            </a:endParaRPr>
+          </a:p>
+          <a:p>
+            <a:pPr marL="12700">
+              <a:lnSpc>
+                <a:spcPct val="100000"/>
+              </a:lnSpc>
+              <a:spcBef>
+                <a:spcPts val="5"/>
+              </a:spcBef>
+            </a:pPr>
+            <a:r>
+              <a:rPr sz="1400" dirty="0">
+                <a:latin typeface="Arial MT"/>
+                <a:cs typeface="Arial MT"/>
+              </a:rPr>
+              <a:t>By</a:t>
+            </a:r>
+            <a:r>
+              <a:rPr sz="1400" spc="5" dirty="0">
+                <a:latin typeface="Arial MT"/>
+                <a:cs typeface="Arial MT"/>
+              </a:rPr>
+              <a:t> </a:t>
+            </a:r>
+            <a:r>
+              <a:rPr sz="1400" spc="-5" dirty="0">
+                <a:latin typeface="Arial MT"/>
+                <a:cs typeface="Arial MT"/>
+              </a:rPr>
+              <a:t>doing</a:t>
+            </a:r>
+            <a:r>
+              <a:rPr sz="1400" spc="-30" dirty="0">
+                <a:latin typeface="Arial MT"/>
+                <a:cs typeface="Arial MT"/>
+              </a:rPr>
+              <a:t> </a:t>
+            </a:r>
+            <a:r>
+              <a:rPr sz="1400" spc="-5" dirty="0">
+                <a:latin typeface="Arial MT"/>
+                <a:cs typeface="Arial MT"/>
+              </a:rPr>
+              <a:t>this</a:t>
+            </a:r>
+            <a:r>
+              <a:rPr sz="1400" spc="-10" dirty="0">
+                <a:latin typeface="Arial MT"/>
+                <a:cs typeface="Arial MT"/>
+              </a:rPr>
+              <a:t> we’ll</a:t>
+            </a:r>
+            <a:r>
+              <a:rPr sz="1400" spc="10" dirty="0">
+                <a:latin typeface="Arial MT"/>
+                <a:cs typeface="Arial MT"/>
+              </a:rPr>
+              <a:t> </a:t>
+            </a:r>
+            <a:r>
+              <a:rPr sz="1400" dirty="0">
+                <a:latin typeface="Arial MT"/>
+                <a:cs typeface="Arial MT"/>
+              </a:rPr>
+              <a:t>try</a:t>
+            </a:r>
+            <a:r>
+              <a:rPr sz="1400" spc="-10" dirty="0">
+                <a:latin typeface="Arial MT"/>
+                <a:cs typeface="Arial MT"/>
+              </a:rPr>
+              <a:t> </a:t>
+            </a:r>
+            <a:r>
+              <a:rPr sz="1400" dirty="0">
+                <a:latin typeface="Arial MT"/>
+                <a:cs typeface="Arial MT"/>
+              </a:rPr>
+              <a:t>to</a:t>
+            </a:r>
+            <a:r>
+              <a:rPr sz="1400" spc="-10" dirty="0">
+                <a:latin typeface="Arial MT"/>
+                <a:cs typeface="Arial MT"/>
+              </a:rPr>
+              <a:t> </a:t>
+            </a:r>
+            <a:r>
+              <a:rPr sz="1400" spc="-5" dirty="0">
+                <a:latin typeface="Arial MT"/>
+                <a:cs typeface="Arial MT"/>
+              </a:rPr>
+              <a:t>find</a:t>
+            </a:r>
+            <a:r>
+              <a:rPr sz="1400" spc="-15" dirty="0">
+                <a:latin typeface="Arial MT"/>
+                <a:cs typeface="Arial MT"/>
+              </a:rPr>
+              <a:t> </a:t>
+            </a:r>
+            <a:r>
+              <a:rPr sz="1400" spc="-5" dirty="0">
+                <a:latin typeface="Arial MT"/>
+                <a:cs typeface="Arial MT"/>
+              </a:rPr>
+              <a:t>out</a:t>
+            </a:r>
+            <a:r>
+              <a:rPr sz="1400" spc="-10" dirty="0">
+                <a:latin typeface="Arial MT"/>
+                <a:cs typeface="Arial MT"/>
+              </a:rPr>
+              <a:t> </a:t>
+            </a:r>
+            <a:r>
+              <a:rPr sz="1400" dirty="0">
+                <a:latin typeface="Arial MT"/>
+                <a:cs typeface="Arial MT"/>
+              </a:rPr>
+              <a:t>key</a:t>
+            </a:r>
+            <a:r>
+              <a:rPr sz="1400" spc="-20" dirty="0">
+                <a:latin typeface="Arial MT"/>
+                <a:cs typeface="Arial MT"/>
+              </a:rPr>
+              <a:t> </a:t>
+            </a:r>
+            <a:r>
+              <a:rPr sz="1400" spc="-5" dirty="0">
+                <a:latin typeface="Arial MT"/>
+                <a:cs typeface="Arial MT"/>
+              </a:rPr>
+              <a:t>factors</a:t>
+            </a:r>
+            <a:r>
+              <a:rPr sz="1400" spc="-45" dirty="0">
+                <a:latin typeface="Arial MT"/>
+                <a:cs typeface="Arial MT"/>
+              </a:rPr>
+              <a:t> </a:t>
+            </a:r>
+            <a:r>
+              <a:rPr sz="1400" spc="-5" dirty="0">
+                <a:latin typeface="Arial MT"/>
+                <a:cs typeface="Arial MT"/>
+              </a:rPr>
+              <a:t>driving </a:t>
+            </a:r>
+            <a:r>
+              <a:rPr sz="1400" dirty="0">
+                <a:latin typeface="Arial MT"/>
+                <a:cs typeface="Arial MT"/>
+              </a:rPr>
+              <a:t>the</a:t>
+            </a:r>
+            <a:r>
+              <a:rPr sz="1400" spc="-15" dirty="0">
+                <a:latin typeface="Arial MT"/>
+                <a:cs typeface="Arial MT"/>
+              </a:rPr>
+              <a:t> </a:t>
+            </a:r>
+            <a:r>
+              <a:rPr sz="1400" spc="-5" dirty="0">
+                <a:latin typeface="Arial MT"/>
+                <a:cs typeface="Arial MT"/>
+              </a:rPr>
+              <a:t>hotel</a:t>
+            </a:r>
+            <a:r>
+              <a:rPr sz="1400" spc="-20" dirty="0">
+                <a:latin typeface="Arial MT"/>
+                <a:cs typeface="Arial MT"/>
+              </a:rPr>
+              <a:t> </a:t>
+            </a:r>
+            <a:r>
+              <a:rPr sz="1400" spc="-5" dirty="0">
+                <a:latin typeface="Arial MT"/>
+                <a:cs typeface="Arial MT"/>
+              </a:rPr>
+              <a:t>bookings</a:t>
+            </a:r>
+            <a:r>
+              <a:rPr sz="1400" spc="-35" dirty="0">
+                <a:latin typeface="Arial MT"/>
+                <a:cs typeface="Arial MT"/>
+              </a:rPr>
+              <a:t> </a:t>
+            </a:r>
+            <a:r>
+              <a:rPr sz="1400" dirty="0">
+                <a:latin typeface="Arial MT"/>
+                <a:cs typeface="Arial MT"/>
+              </a:rPr>
+              <a:t>trends.</a:t>
+            </a:r>
+            <a:endParaRPr sz="1400">
+              <a:latin typeface="Arial MT"/>
+              <a:cs typeface="Arial MT"/>
+            </a:endParaRPr>
+          </a:p>
+        </p:txBody>
+      </p:sp>
+    </p:spTree>
+  </p:cSld>
+  <p:clrMapOvr>
+    <a:masterClrMapping/>
+  </p:clrMapOvr>
+</p:sld>
+</file>
+
+<file path=ppt/slides/slide30.xml><?xml version="1.0" encoding="utf-8"?>
 <p:sld xmlns:a="http://schemas.openxmlformats.org/drawingml/2006/main" xmlns:r="http://schemas.openxmlformats.org/officeDocument/2006/relationships" xmlns:p="http://schemas.openxmlformats.org/presentationml/2006/main">
   <p:cSld>
     <p:spTree>
@@ -17698,965 +18858,7 @@
 </p:sld>
 </file>
 
-<file path=ppt/slides/slide3.xml><?xml version="1.0" encoding="utf-8"?>
-<p:sld xmlns:a="http://schemas.openxmlformats.org/drawingml/2006/main" xmlns:r="http://schemas.openxmlformats.org/officeDocument/2006/relationships" xmlns:p="http://schemas.openxmlformats.org/presentationml/2006/main">
-  <p:cSld>
-    <p:spTree>
-      <p:nvGrpSpPr>
-        <p:cNvPr id="1" name=""/>
-        <p:cNvGrpSpPr/>
-        <p:nvPr/>
-      </p:nvGrpSpPr>
-      <p:grpSpPr>
-        <a:xfrm>
-          <a:off x="0" y="0"/>
-          <a:ext cx="0" cy="0"/>
-          <a:chOff x="0" y="0"/>
-          <a:chExt cx="0" cy="0"/>
-        </a:xfrm>
-      </p:grpSpPr>
-      <p:sp>
-        <p:nvSpPr>
-          <p:cNvPr id="2" name="object 2"/>
-          <p:cNvSpPr txBox="1">
-            <a:spLocks noGrp="1"/>
-          </p:cNvSpPr>
-          <p:nvPr>
-            <p:ph type="title"/>
-          </p:nvPr>
-        </p:nvSpPr>
-        <p:spPr>
-          <a:xfrm>
-            <a:off x="3462273" y="400558"/>
-            <a:ext cx="1423670" cy="482600"/>
-          </a:xfrm>
-          <a:prstGeom prst="rect">
-            <a:avLst/>
-          </a:prstGeom>
-        </p:spPr>
-        <p:txBody>
-          <a:bodyPr vert="horz" wrap="square" lIns="0" tIns="12700" rIns="0" bIns="0" rtlCol="0">
-            <a:spAutoFit/>
-          </a:bodyPr>
-          <a:lstStyle/>
-          <a:p>
-            <a:pPr marL="12700">
-              <a:lnSpc>
-                <a:spcPct val="100000"/>
-              </a:lnSpc>
-              <a:spcBef>
-                <a:spcPts val="100"/>
-              </a:spcBef>
-            </a:pPr>
-            <a:r>
-              <a:rPr sz="3000" dirty="0"/>
-              <a:t>A</a:t>
-            </a:r>
-            <a:r>
-              <a:rPr sz="3000" spc="5" dirty="0"/>
-              <a:t>g</a:t>
-            </a:r>
-            <a:r>
-              <a:rPr sz="3000" dirty="0"/>
-              <a:t>enda</a:t>
-            </a:r>
-            <a:endParaRPr sz="3000"/>
-          </a:p>
-        </p:txBody>
-      </p:sp>
-      <p:sp>
-        <p:nvSpPr>
-          <p:cNvPr id="3" name="object 3"/>
-          <p:cNvSpPr txBox="1"/>
-          <p:nvPr/>
-        </p:nvSpPr>
-        <p:spPr>
-          <a:xfrm>
-            <a:off x="790143" y="1309827"/>
-            <a:ext cx="6066155" cy="3441065"/>
-          </a:xfrm>
-          <a:prstGeom prst="rect">
-            <a:avLst/>
-          </a:prstGeom>
-        </p:spPr>
-        <p:txBody>
-          <a:bodyPr vert="horz" wrap="square" lIns="0" tIns="13335" rIns="0" bIns="0" rtlCol="0">
-            <a:spAutoFit/>
-          </a:bodyPr>
-          <a:lstStyle/>
-          <a:p>
-            <a:pPr marL="12700">
-              <a:lnSpc>
-                <a:spcPct val="100000"/>
-              </a:lnSpc>
-              <a:spcBef>
-                <a:spcPts val="105"/>
-              </a:spcBef>
-            </a:pPr>
-            <a:r>
-              <a:rPr sz="1400" spc="-5" dirty="0">
-                <a:latin typeface="Arial MT"/>
-                <a:cs typeface="Arial MT"/>
-              </a:rPr>
-              <a:t>To </a:t>
-            </a:r>
-            <a:r>
-              <a:rPr sz="1400" dirty="0">
-                <a:latin typeface="Arial MT"/>
-                <a:cs typeface="Arial MT"/>
-              </a:rPr>
-              <a:t>discuss</a:t>
-            </a:r>
-            <a:r>
-              <a:rPr sz="1400" spc="-25" dirty="0">
-                <a:latin typeface="Arial MT"/>
-                <a:cs typeface="Arial MT"/>
-              </a:rPr>
-              <a:t> </a:t>
-            </a:r>
-            <a:r>
-              <a:rPr sz="1400" dirty="0">
-                <a:latin typeface="Arial MT"/>
-                <a:cs typeface="Arial MT"/>
-              </a:rPr>
-              <a:t>the</a:t>
-            </a:r>
-            <a:r>
-              <a:rPr sz="1400" spc="-30" dirty="0">
-                <a:latin typeface="Arial MT"/>
-                <a:cs typeface="Arial MT"/>
-              </a:rPr>
-              <a:t> </a:t>
-            </a:r>
-            <a:r>
-              <a:rPr sz="1400" spc="-5" dirty="0">
-                <a:latin typeface="Arial MT"/>
-                <a:cs typeface="Arial MT"/>
-              </a:rPr>
-              <a:t>analysis </a:t>
-            </a:r>
-            <a:r>
-              <a:rPr sz="1400" dirty="0">
-                <a:latin typeface="Arial MT"/>
-                <a:cs typeface="Arial MT"/>
-              </a:rPr>
-              <a:t>of</a:t>
-            </a:r>
-            <a:r>
-              <a:rPr sz="1400" spc="5" dirty="0">
-                <a:latin typeface="Arial MT"/>
-                <a:cs typeface="Arial MT"/>
-              </a:rPr>
-              <a:t> </a:t>
-            </a:r>
-            <a:r>
-              <a:rPr sz="1400" spc="-5" dirty="0">
-                <a:latin typeface="Arial MT"/>
-                <a:cs typeface="Arial MT"/>
-              </a:rPr>
-              <a:t>given</a:t>
-            </a:r>
-            <a:r>
-              <a:rPr sz="1400" spc="5" dirty="0">
-                <a:latin typeface="Arial MT"/>
-                <a:cs typeface="Arial MT"/>
-              </a:rPr>
-              <a:t> </a:t>
-            </a:r>
-            <a:r>
-              <a:rPr sz="1400" dirty="0">
-                <a:latin typeface="Arial MT"/>
-                <a:cs typeface="Arial MT"/>
-              </a:rPr>
-              <a:t>hotel</a:t>
-            </a:r>
-            <a:r>
-              <a:rPr sz="1400" spc="-30" dirty="0">
-                <a:latin typeface="Arial MT"/>
-                <a:cs typeface="Arial MT"/>
-              </a:rPr>
-              <a:t> </a:t>
-            </a:r>
-            <a:r>
-              <a:rPr sz="1400" dirty="0">
-                <a:latin typeface="Arial MT"/>
-                <a:cs typeface="Arial MT"/>
-              </a:rPr>
-              <a:t>bookings</a:t>
-            </a:r>
-            <a:r>
-              <a:rPr sz="1400" spc="-35" dirty="0">
-                <a:latin typeface="Arial MT"/>
-                <a:cs typeface="Arial MT"/>
-              </a:rPr>
-              <a:t> </a:t>
-            </a:r>
-            <a:r>
-              <a:rPr sz="1400" dirty="0">
-                <a:latin typeface="Arial MT"/>
-                <a:cs typeface="Arial MT"/>
-              </a:rPr>
-              <a:t>data</a:t>
-            </a:r>
-            <a:r>
-              <a:rPr sz="1400" spc="-10" dirty="0">
-                <a:latin typeface="Arial MT"/>
-                <a:cs typeface="Arial MT"/>
-              </a:rPr>
-              <a:t> </a:t>
-            </a:r>
-            <a:r>
-              <a:rPr sz="1400" dirty="0">
-                <a:latin typeface="Arial MT"/>
-                <a:cs typeface="Arial MT"/>
-              </a:rPr>
-              <a:t>set</a:t>
-            </a:r>
-            <a:r>
-              <a:rPr sz="1400" spc="-20" dirty="0">
-                <a:latin typeface="Arial MT"/>
-                <a:cs typeface="Arial MT"/>
-              </a:rPr>
-              <a:t> </a:t>
-            </a:r>
-            <a:r>
-              <a:rPr sz="1400" dirty="0">
-                <a:latin typeface="Arial MT"/>
-                <a:cs typeface="Arial MT"/>
-              </a:rPr>
-              <a:t>from</a:t>
-            </a:r>
-            <a:r>
-              <a:rPr sz="1400" spc="-20" dirty="0">
-                <a:latin typeface="Arial MT"/>
-                <a:cs typeface="Arial MT"/>
-              </a:rPr>
-              <a:t> </a:t>
-            </a:r>
-            <a:r>
-              <a:rPr sz="1400" spc="-5" dirty="0">
-                <a:latin typeface="Arial MT"/>
-                <a:cs typeface="Arial MT"/>
-              </a:rPr>
-              <a:t>2015-2017.</a:t>
-            </a:r>
-            <a:endParaRPr sz="1400">
-              <a:latin typeface="Arial MT"/>
-              <a:cs typeface="Arial MT"/>
-            </a:endParaRPr>
-          </a:p>
-          <a:p>
-            <a:pPr>
-              <a:lnSpc>
-                <a:spcPct val="100000"/>
-              </a:lnSpc>
-              <a:spcBef>
-                <a:spcPts val="15"/>
-              </a:spcBef>
-            </a:pPr>
-            <a:endParaRPr sz="1450">
-              <a:latin typeface="Arial MT"/>
-              <a:cs typeface="Arial MT"/>
-            </a:endParaRPr>
-          </a:p>
-          <a:p>
-            <a:pPr marL="12700">
-              <a:lnSpc>
-                <a:spcPct val="100000"/>
-              </a:lnSpc>
-            </a:pPr>
-            <a:r>
-              <a:rPr sz="1400" dirty="0">
-                <a:latin typeface="Arial MT"/>
-                <a:cs typeface="Arial MT"/>
-              </a:rPr>
-              <a:t>We’ll</a:t>
-            </a:r>
-            <a:r>
-              <a:rPr sz="1400" spc="-30" dirty="0">
-                <a:latin typeface="Arial MT"/>
-                <a:cs typeface="Arial MT"/>
-              </a:rPr>
-              <a:t> </a:t>
-            </a:r>
-            <a:r>
-              <a:rPr sz="1400" spc="-5" dirty="0">
-                <a:latin typeface="Arial MT"/>
-                <a:cs typeface="Arial MT"/>
-              </a:rPr>
-              <a:t>be</a:t>
-            </a:r>
-            <a:r>
-              <a:rPr sz="1400" spc="-10" dirty="0">
-                <a:latin typeface="Arial MT"/>
-                <a:cs typeface="Arial MT"/>
-              </a:rPr>
-              <a:t> </a:t>
-            </a:r>
-            <a:r>
-              <a:rPr sz="1400" spc="-5" dirty="0">
-                <a:latin typeface="Arial MT"/>
-                <a:cs typeface="Arial MT"/>
-              </a:rPr>
-              <a:t>doing</a:t>
-            </a:r>
-            <a:r>
-              <a:rPr sz="1400" spc="-25" dirty="0">
-                <a:latin typeface="Arial MT"/>
-                <a:cs typeface="Arial MT"/>
-              </a:rPr>
-              <a:t> </a:t>
-            </a:r>
-            <a:r>
-              <a:rPr sz="1400" spc="-5" dirty="0">
-                <a:latin typeface="Arial MT"/>
-                <a:cs typeface="Arial MT"/>
-              </a:rPr>
-              <a:t>analysis</a:t>
-            </a:r>
-            <a:r>
-              <a:rPr sz="1400" spc="-10" dirty="0">
-                <a:latin typeface="Arial MT"/>
-                <a:cs typeface="Arial MT"/>
-              </a:rPr>
-              <a:t> </a:t>
-            </a:r>
-            <a:r>
-              <a:rPr sz="1400" spc="-5" dirty="0">
-                <a:latin typeface="Arial MT"/>
-                <a:cs typeface="Arial MT"/>
-              </a:rPr>
-              <a:t>of</a:t>
-            </a:r>
-            <a:r>
-              <a:rPr sz="1400" spc="-15" dirty="0">
-                <a:latin typeface="Arial MT"/>
-                <a:cs typeface="Arial MT"/>
-              </a:rPr>
-              <a:t> </a:t>
-            </a:r>
-            <a:r>
-              <a:rPr sz="1400" spc="-10" dirty="0">
-                <a:latin typeface="Arial MT"/>
-                <a:cs typeface="Arial MT"/>
-              </a:rPr>
-              <a:t>given </a:t>
-            </a:r>
-            <a:r>
-              <a:rPr sz="1400" spc="-5" dirty="0">
-                <a:latin typeface="Arial MT"/>
-                <a:cs typeface="Arial MT"/>
-              </a:rPr>
-              <a:t>data</a:t>
-            </a:r>
-            <a:r>
-              <a:rPr sz="1400" spc="-20" dirty="0">
-                <a:latin typeface="Arial MT"/>
-                <a:cs typeface="Arial MT"/>
-              </a:rPr>
-              <a:t> </a:t>
-            </a:r>
-            <a:r>
-              <a:rPr sz="1400" dirty="0">
-                <a:latin typeface="Arial MT"/>
-                <a:cs typeface="Arial MT"/>
-              </a:rPr>
-              <a:t>set</a:t>
-            </a:r>
-            <a:r>
-              <a:rPr sz="1400" spc="-25" dirty="0">
-                <a:latin typeface="Arial MT"/>
-                <a:cs typeface="Arial MT"/>
-              </a:rPr>
-              <a:t> </a:t>
-            </a:r>
-            <a:r>
-              <a:rPr sz="1400" spc="-5" dirty="0">
-                <a:latin typeface="Arial MT"/>
-                <a:cs typeface="Arial MT"/>
-              </a:rPr>
-              <a:t>in</a:t>
-            </a:r>
-            <a:r>
-              <a:rPr sz="1400" spc="-10" dirty="0">
-                <a:latin typeface="Arial MT"/>
-                <a:cs typeface="Arial MT"/>
-              </a:rPr>
-              <a:t> </a:t>
-            </a:r>
-            <a:r>
-              <a:rPr sz="1400" spc="-5" dirty="0">
-                <a:latin typeface="Arial MT"/>
-                <a:cs typeface="Arial MT"/>
-              </a:rPr>
-              <a:t>following</a:t>
-            </a:r>
-            <a:r>
-              <a:rPr sz="1400" spc="-20" dirty="0">
-                <a:latin typeface="Arial MT"/>
-                <a:cs typeface="Arial MT"/>
-              </a:rPr>
-              <a:t> </a:t>
-            </a:r>
-            <a:r>
-              <a:rPr sz="1400" spc="-10" dirty="0">
-                <a:latin typeface="Arial MT"/>
-                <a:cs typeface="Arial MT"/>
-              </a:rPr>
-              <a:t>ways</a:t>
-            </a:r>
-            <a:r>
-              <a:rPr sz="1400" spc="50" dirty="0">
-                <a:latin typeface="Arial MT"/>
-                <a:cs typeface="Arial MT"/>
-              </a:rPr>
-              <a:t> </a:t>
-            </a:r>
-            <a:r>
-              <a:rPr sz="1400" dirty="0">
-                <a:latin typeface="Arial MT"/>
-                <a:cs typeface="Arial MT"/>
-              </a:rPr>
-              <a:t>:</a:t>
-            </a:r>
-            <a:endParaRPr sz="1400">
-              <a:latin typeface="Arial MT"/>
-              <a:cs typeface="Arial MT"/>
-            </a:endParaRPr>
-          </a:p>
-          <a:p>
-            <a:pPr marL="299085" indent="-287020">
-              <a:lnSpc>
-                <a:spcPct val="100000"/>
-              </a:lnSpc>
-              <a:spcBef>
-                <a:spcPts val="1165"/>
-              </a:spcBef>
-              <a:buChar char="•"/>
-              <a:tabLst>
-                <a:tab pos="299085" algn="l"/>
-                <a:tab pos="299720" algn="l"/>
-              </a:tabLst>
-            </a:pPr>
-            <a:r>
-              <a:rPr sz="1400" spc="-5" dirty="0">
-                <a:latin typeface="Arial MT"/>
-                <a:cs typeface="Arial MT"/>
-              </a:rPr>
-              <a:t>Univariate</a:t>
-            </a:r>
-            <a:r>
-              <a:rPr sz="1400" spc="-50" dirty="0">
-                <a:latin typeface="Arial MT"/>
-                <a:cs typeface="Arial MT"/>
-              </a:rPr>
-              <a:t> </a:t>
-            </a:r>
-            <a:r>
-              <a:rPr sz="1400" spc="-5" dirty="0">
-                <a:latin typeface="Arial MT"/>
-                <a:cs typeface="Arial MT"/>
-              </a:rPr>
-              <a:t>analysis</a:t>
-            </a:r>
-            <a:endParaRPr sz="1400">
-              <a:latin typeface="Arial MT"/>
-              <a:cs typeface="Arial MT"/>
-            </a:endParaRPr>
-          </a:p>
-          <a:p>
-            <a:pPr>
-              <a:lnSpc>
-                <a:spcPct val="100000"/>
-              </a:lnSpc>
-              <a:spcBef>
-                <a:spcPts val="10"/>
-              </a:spcBef>
-              <a:buFont typeface="Arial MT"/>
-              <a:buChar char="•"/>
-            </a:pPr>
-            <a:endParaRPr sz="1450">
-              <a:latin typeface="Arial MT"/>
-              <a:cs typeface="Arial MT"/>
-            </a:endParaRPr>
-          </a:p>
-          <a:p>
-            <a:pPr marL="299085" indent="-287020">
-              <a:lnSpc>
-                <a:spcPct val="100000"/>
-              </a:lnSpc>
-              <a:buChar char="•"/>
-              <a:tabLst>
-                <a:tab pos="299085" algn="l"/>
-                <a:tab pos="299720" algn="l"/>
-              </a:tabLst>
-            </a:pPr>
-            <a:r>
-              <a:rPr sz="1400" dirty="0">
-                <a:latin typeface="Arial MT"/>
-                <a:cs typeface="Arial MT"/>
-              </a:rPr>
-              <a:t>Hotel</a:t>
-            </a:r>
-            <a:r>
-              <a:rPr sz="1400" spc="-45" dirty="0">
-                <a:latin typeface="Arial MT"/>
-                <a:cs typeface="Arial MT"/>
-              </a:rPr>
-              <a:t> </a:t>
-            </a:r>
-            <a:r>
-              <a:rPr sz="1400" spc="-5" dirty="0">
-                <a:latin typeface="Arial MT"/>
-                <a:cs typeface="Arial MT"/>
-              </a:rPr>
-              <a:t>wise</a:t>
-            </a:r>
-            <a:r>
-              <a:rPr sz="1400" spc="-25" dirty="0">
-                <a:latin typeface="Arial MT"/>
-                <a:cs typeface="Arial MT"/>
-              </a:rPr>
-              <a:t> </a:t>
-            </a:r>
-            <a:r>
-              <a:rPr sz="1400" spc="-5" dirty="0">
-                <a:latin typeface="Arial MT"/>
-                <a:cs typeface="Arial MT"/>
-              </a:rPr>
-              <a:t>analysis</a:t>
-            </a:r>
-            <a:endParaRPr sz="1400">
-              <a:latin typeface="Arial MT"/>
-              <a:cs typeface="Arial MT"/>
-            </a:endParaRPr>
-          </a:p>
-          <a:p>
-            <a:pPr>
-              <a:lnSpc>
-                <a:spcPct val="100000"/>
-              </a:lnSpc>
-              <a:spcBef>
-                <a:spcPts val="15"/>
-              </a:spcBef>
-              <a:buFont typeface="Arial MT"/>
-              <a:buChar char="•"/>
-            </a:pPr>
-            <a:endParaRPr sz="1450">
-              <a:latin typeface="Arial MT"/>
-              <a:cs typeface="Arial MT"/>
-            </a:endParaRPr>
-          </a:p>
-          <a:p>
-            <a:pPr marL="299085" indent="-287020">
-              <a:lnSpc>
-                <a:spcPct val="100000"/>
-              </a:lnSpc>
-              <a:buChar char="•"/>
-              <a:tabLst>
-                <a:tab pos="299085" algn="l"/>
-                <a:tab pos="299720" algn="l"/>
-              </a:tabLst>
-            </a:pPr>
-            <a:r>
-              <a:rPr sz="1400" dirty="0">
-                <a:latin typeface="Arial MT"/>
-                <a:cs typeface="Arial MT"/>
-              </a:rPr>
-              <a:t>Distribution</a:t>
-            </a:r>
-            <a:r>
-              <a:rPr sz="1400" spc="-60" dirty="0">
-                <a:latin typeface="Arial MT"/>
-                <a:cs typeface="Arial MT"/>
-              </a:rPr>
-              <a:t> </a:t>
-            </a:r>
-            <a:r>
-              <a:rPr sz="1400" dirty="0">
-                <a:latin typeface="Arial MT"/>
-                <a:cs typeface="Arial MT"/>
-              </a:rPr>
-              <a:t>Channel</a:t>
-            </a:r>
-            <a:r>
-              <a:rPr sz="1400" spc="-45" dirty="0">
-                <a:latin typeface="Arial MT"/>
-                <a:cs typeface="Arial MT"/>
-              </a:rPr>
-              <a:t> </a:t>
-            </a:r>
-            <a:r>
-              <a:rPr sz="1400" spc="-5" dirty="0">
-                <a:latin typeface="Arial MT"/>
-                <a:cs typeface="Arial MT"/>
-              </a:rPr>
-              <a:t>wise analysis</a:t>
-            </a:r>
-            <a:endParaRPr sz="1400">
-              <a:latin typeface="Arial MT"/>
-              <a:cs typeface="Arial MT"/>
-            </a:endParaRPr>
-          </a:p>
-          <a:p>
-            <a:pPr>
-              <a:lnSpc>
-                <a:spcPct val="100000"/>
-              </a:lnSpc>
-              <a:spcBef>
-                <a:spcPts val="15"/>
-              </a:spcBef>
-              <a:buFont typeface="Arial MT"/>
-              <a:buChar char="•"/>
-            </a:pPr>
-            <a:endParaRPr sz="1450">
-              <a:latin typeface="Arial MT"/>
-              <a:cs typeface="Arial MT"/>
-            </a:endParaRPr>
-          </a:p>
-          <a:p>
-            <a:pPr marL="299085" indent="-287020">
-              <a:lnSpc>
-                <a:spcPct val="100000"/>
-              </a:lnSpc>
-              <a:buChar char="•"/>
-              <a:tabLst>
-                <a:tab pos="299085" algn="l"/>
-                <a:tab pos="299720" algn="l"/>
-              </a:tabLst>
-            </a:pPr>
-            <a:r>
-              <a:rPr sz="1400" dirty="0">
-                <a:latin typeface="Arial MT"/>
-                <a:cs typeface="Arial MT"/>
-              </a:rPr>
-              <a:t>Booking</a:t>
-            </a:r>
-            <a:r>
-              <a:rPr sz="1400" spc="-45" dirty="0">
-                <a:latin typeface="Arial MT"/>
-                <a:cs typeface="Arial MT"/>
-              </a:rPr>
-              <a:t> </a:t>
-            </a:r>
-            <a:r>
-              <a:rPr sz="1400" dirty="0">
-                <a:latin typeface="Arial MT"/>
-                <a:cs typeface="Arial MT"/>
-              </a:rPr>
-              <a:t>cancellation</a:t>
-            </a:r>
-            <a:r>
-              <a:rPr sz="1400" spc="-60" dirty="0">
-                <a:latin typeface="Arial MT"/>
-                <a:cs typeface="Arial MT"/>
-              </a:rPr>
-              <a:t> </a:t>
-            </a:r>
-            <a:r>
-              <a:rPr sz="1400" spc="-5" dirty="0">
-                <a:latin typeface="Arial MT"/>
-                <a:cs typeface="Arial MT"/>
-              </a:rPr>
-              <a:t>analysis</a:t>
-            </a:r>
-            <a:endParaRPr sz="1400">
-              <a:latin typeface="Arial MT"/>
-              <a:cs typeface="Arial MT"/>
-            </a:endParaRPr>
-          </a:p>
-          <a:p>
-            <a:pPr>
-              <a:lnSpc>
-                <a:spcPct val="100000"/>
-              </a:lnSpc>
-              <a:spcBef>
-                <a:spcPts val="15"/>
-              </a:spcBef>
-              <a:buFont typeface="Arial MT"/>
-              <a:buChar char="•"/>
-            </a:pPr>
-            <a:endParaRPr sz="1450">
-              <a:latin typeface="Arial MT"/>
-              <a:cs typeface="Arial MT"/>
-            </a:endParaRPr>
-          </a:p>
-          <a:p>
-            <a:pPr marL="299085" indent="-287020">
-              <a:lnSpc>
-                <a:spcPct val="100000"/>
-              </a:lnSpc>
-              <a:buChar char="•"/>
-              <a:tabLst>
-                <a:tab pos="299085" algn="l"/>
-                <a:tab pos="299720" algn="l"/>
-              </a:tabLst>
-            </a:pPr>
-            <a:r>
-              <a:rPr sz="1400" spc="-5" dirty="0">
-                <a:latin typeface="Arial MT"/>
-                <a:cs typeface="Arial MT"/>
-              </a:rPr>
-              <a:t>Timewise</a:t>
-            </a:r>
-            <a:r>
-              <a:rPr sz="1400" spc="-35" dirty="0">
-                <a:latin typeface="Arial MT"/>
-                <a:cs typeface="Arial MT"/>
-              </a:rPr>
-              <a:t> </a:t>
-            </a:r>
-            <a:r>
-              <a:rPr sz="1400" spc="-5" dirty="0">
-                <a:latin typeface="Arial MT"/>
-                <a:cs typeface="Arial MT"/>
-              </a:rPr>
-              <a:t>analysis</a:t>
-            </a:r>
-            <a:endParaRPr sz="1400">
-              <a:latin typeface="Arial MT"/>
-              <a:cs typeface="Arial MT"/>
-            </a:endParaRPr>
-          </a:p>
-          <a:p>
-            <a:pPr>
-              <a:lnSpc>
-                <a:spcPct val="100000"/>
-              </a:lnSpc>
-            </a:pPr>
-            <a:endParaRPr sz="1500">
-              <a:latin typeface="Arial MT"/>
-              <a:cs typeface="Arial MT"/>
-            </a:endParaRPr>
-          </a:p>
-          <a:p>
-            <a:pPr>
-              <a:lnSpc>
-                <a:spcPct val="100000"/>
-              </a:lnSpc>
-              <a:spcBef>
-                <a:spcPts val="20"/>
-              </a:spcBef>
-            </a:pPr>
-            <a:endParaRPr sz="1850">
-              <a:latin typeface="Arial MT"/>
-              <a:cs typeface="Arial MT"/>
-            </a:endParaRPr>
-          </a:p>
-          <a:p>
-            <a:pPr marL="12700">
-              <a:lnSpc>
-                <a:spcPct val="100000"/>
-              </a:lnSpc>
-              <a:spcBef>
-                <a:spcPts val="5"/>
-              </a:spcBef>
-            </a:pPr>
-            <a:r>
-              <a:rPr sz="1400" dirty="0">
-                <a:latin typeface="Arial MT"/>
-                <a:cs typeface="Arial MT"/>
-              </a:rPr>
-              <a:t>By</a:t>
-            </a:r>
-            <a:r>
-              <a:rPr sz="1400" spc="5" dirty="0">
-                <a:latin typeface="Arial MT"/>
-                <a:cs typeface="Arial MT"/>
-              </a:rPr>
-              <a:t> </a:t>
-            </a:r>
-            <a:r>
-              <a:rPr sz="1400" spc="-5" dirty="0">
-                <a:latin typeface="Arial MT"/>
-                <a:cs typeface="Arial MT"/>
-              </a:rPr>
-              <a:t>doing</a:t>
-            </a:r>
-            <a:r>
-              <a:rPr sz="1400" spc="-30" dirty="0">
-                <a:latin typeface="Arial MT"/>
-                <a:cs typeface="Arial MT"/>
-              </a:rPr>
-              <a:t> </a:t>
-            </a:r>
-            <a:r>
-              <a:rPr sz="1400" spc="-5" dirty="0">
-                <a:latin typeface="Arial MT"/>
-                <a:cs typeface="Arial MT"/>
-              </a:rPr>
-              <a:t>this</a:t>
-            </a:r>
-            <a:r>
-              <a:rPr sz="1400" spc="-10" dirty="0">
-                <a:latin typeface="Arial MT"/>
-                <a:cs typeface="Arial MT"/>
-              </a:rPr>
-              <a:t> we’ll</a:t>
-            </a:r>
-            <a:r>
-              <a:rPr sz="1400" spc="10" dirty="0">
-                <a:latin typeface="Arial MT"/>
-                <a:cs typeface="Arial MT"/>
-              </a:rPr>
-              <a:t> </a:t>
-            </a:r>
-            <a:r>
-              <a:rPr sz="1400" dirty="0">
-                <a:latin typeface="Arial MT"/>
-                <a:cs typeface="Arial MT"/>
-              </a:rPr>
-              <a:t>try</a:t>
-            </a:r>
-            <a:r>
-              <a:rPr sz="1400" spc="-10" dirty="0">
-                <a:latin typeface="Arial MT"/>
-                <a:cs typeface="Arial MT"/>
-              </a:rPr>
-              <a:t> </a:t>
-            </a:r>
-            <a:r>
-              <a:rPr sz="1400" dirty="0">
-                <a:latin typeface="Arial MT"/>
-                <a:cs typeface="Arial MT"/>
-              </a:rPr>
-              <a:t>to</a:t>
-            </a:r>
-            <a:r>
-              <a:rPr sz="1400" spc="-10" dirty="0">
-                <a:latin typeface="Arial MT"/>
-                <a:cs typeface="Arial MT"/>
-              </a:rPr>
-              <a:t> </a:t>
-            </a:r>
-            <a:r>
-              <a:rPr sz="1400" spc="-5" dirty="0">
-                <a:latin typeface="Arial MT"/>
-                <a:cs typeface="Arial MT"/>
-              </a:rPr>
-              <a:t>find</a:t>
-            </a:r>
-            <a:r>
-              <a:rPr sz="1400" spc="-15" dirty="0">
-                <a:latin typeface="Arial MT"/>
-                <a:cs typeface="Arial MT"/>
-              </a:rPr>
-              <a:t> </a:t>
-            </a:r>
-            <a:r>
-              <a:rPr sz="1400" spc="-5" dirty="0">
-                <a:latin typeface="Arial MT"/>
-                <a:cs typeface="Arial MT"/>
-              </a:rPr>
-              <a:t>out</a:t>
-            </a:r>
-            <a:r>
-              <a:rPr sz="1400" spc="-10" dirty="0">
-                <a:latin typeface="Arial MT"/>
-                <a:cs typeface="Arial MT"/>
-              </a:rPr>
-              <a:t> </a:t>
-            </a:r>
-            <a:r>
-              <a:rPr sz="1400" dirty="0">
-                <a:latin typeface="Arial MT"/>
-                <a:cs typeface="Arial MT"/>
-              </a:rPr>
-              <a:t>key</a:t>
-            </a:r>
-            <a:r>
-              <a:rPr sz="1400" spc="-20" dirty="0">
-                <a:latin typeface="Arial MT"/>
-                <a:cs typeface="Arial MT"/>
-              </a:rPr>
-              <a:t> </a:t>
-            </a:r>
-            <a:r>
-              <a:rPr sz="1400" spc="-5" dirty="0">
-                <a:latin typeface="Arial MT"/>
-                <a:cs typeface="Arial MT"/>
-              </a:rPr>
-              <a:t>factors</a:t>
-            </a:r>
-            <a:r>
-              <a:rPr sz="1400" spc="-45" dirty="0">
-                <a:latin typeface="Arial MT"/>
-                <a:cs typeface="Arial MT"/>
-              </a:rPr>
-              <a:t> </a:t>
-            </a:r>
-            <a:r>
-              <a:rPr sz="1400" spc="-5" dirty="0">
-                <a:latin typeface="Arial MT"/>
-                <a:cs typeface="Arial MT"/>
-              </a:rPr>
-              <a:t>driving </a:t>
-            </a:r>
-            <a:r>
-              <a:rPr sz="1400" dirty="0">
-                <a:latin typeface="Arial MT"/>
-                <a:cs typeface="Arial MT"/>
-              </a:rPr>
-              <a:t>the</a:t>
-            </a:r>
-            <a:r>
-              <a:rPr sz="1400" spc="-15" dirty="0">
-                <a:latin typeface="Arial MT"/>
-                <a:cs typeface="Arial MT"/>
-              </a:rPr>
-              <a:t> </a:t>
-            </a:r>
-            <a:r>
-              <a:rPr sz="1400" spc="-5" dirty="0">
-                <a:latin typeface="Arial MT"/>
-                <a:cs typeface="Arial MT"/>
-              </a:rPr>
-              <a:t>hotel</a:t>
-            </a:r>
-            <a:r>
-              <a:rPr sz="1400" spc="-20" dirty="0">
-                <a:latin typeface="Arial MT"/>
-                <a:cs typeface="Arial MT"/>
-              </a:rPr>
-              <a:t> </a:t>
-            </a:r>
-            <a:r>
-              <a:rPr sz="1400" spc="-5" dirty="0">
-                <a:latin typeface="Arial MT"/>
-                <a:cs typeface="Arial MT"/>
-              </a:rPr>
-              <a:t>bookings</a:t>
-            </a:r>
-            <a:r>
-              <a:rPr sz="1400" spc="-35" dirty="0">
-                <a:latin typeface="Arial MT"/>
-                <a:cs typeface="Arial MT"/>
-              </a:rPr>
-              <a:t> </a:t>
-            </a:r>
-            <a:r>
-              <a:rPr sz="1400" dirty="0">
-                <a:latin typeface="Arial MT"/>
-                <a:cs typeface="Arial MT"/>
-              </a:rPr>
-              <a:t>trends.</a:t>
-            </a:r>
-            <a:endParaRPr sz="1400">
-              <a:latin typeface="Arial MT"/>
-              <a:cs typeface="Arial MT"/>
-            </a:endParaRPr>
-          </a:p>
-        </p:txBody>
-      </p:sp>
-    </p:spTree>
-  </p:cSld>
-  <p:clrMapOvr>
-    <a:masterClrMapping/>
-  </p:clrMapOvr>
-</p:sld>
-</file>
-
-<file path=ppt/slides/slide30.xml><?xml version="1.0" encoding="utf-8"?>
+<file path=ppt/slides/slide31.xml><?xml version="1.0" encoding="utf-8"?>
 <p:sld xmlns:a="http://schemas.openxmlformats.org/drawingml/2006/main" xmlns:r="http://schemas.openxmlformats.org/officeDocument/2006/relationships" xmlns:p="http://schemas.openxmlformats.org/presentationml/2006/main">
   <p:cSld>
     <p:spTree>
@@ -19369,7 +19571,7 @@
 </p:sld>
 </file>
 
-<file path=ppt/slides/slide31.xml><?xml version="1.0" encoding="utf-8"?>
+<file path=ppt/slides/slide32.xml><?xml version="1.0" encoding="utf-8"?>
 <p:sld xmlns:a="http://schemas.openxmlformats.org/drawingml/2006/main" xmlns:r="http://schemas.openxmlformats.org/officeDocument/2006/relationships" xmlns:p="http://schemas.openxmlformats.org/presentationml/2006/main">
   <p:cSld>
     <p:spTree>
@@ -20155,7 +20357,7 @@
 </p:sld>
 </file>
 
-<file path=ppt/slides/slide32.xml><?xml version="1.0" encoding="utf-8"?>
+<file path=ppt/slides/slide33.xml><?xml version="1.0" encoding="utf-8"?>
 <p:sld xmlns:a="http://schemas.openxmlformats.org/drawingml/2006/main" xmlns:r="http://schemas.openxmlformats.org/officeDocument/2006/relationships" xmlns:p="http://schemas.openxmlformats.org/presentationml/2006/main">
   <p:cSld>
     <p:spTree>
@@ -20807,7 +21009,7 @@
 </p:sld>
 </file>
 
-<file path=ppt/slides/slide33.xml><?xml version="1.0" encoding="utf-8"?>
+<file path=ppt/slides/slide34.xml><?xml version="1.0" encoding="utf-8"?>
 <p:sld xmlns:a="http://schemas.openxmlformats.org/drawingml/2006/main" xmlns:r="http://schemas.openxmlformats.org/officeDocument/2006/relationships" xmlns:p="http://schemas.openxmlformats.org/presentationml/2006/main">
   <p:cSld>
     <p:spTree>
@@ -21710,7 +21912,7 @@
 </p:sld>
 </file>
 
-<file path=ppt/slides/slide34.xml><?xml version="1.0" encoding="utf-8"?>
+<file path=ppt/slides/slide35.xml><?xml version="1.0" encoding="utf-8"?>
 <p:sld xmlns:a="http://schemas.openxmlformats.org/drawingml/2006/main" xmlns:r="http://schemas.openxmlformats.org/officeDocument/2006/relationships" xmlns:p="http://schemas.openxmlformats.org/presentationml/2006/main">
   <p:cSld>
     <p:spTree>
@@ -22149,7 +22351,7 @@
 </p:sld>
 </file>
 
-<file path=ppt/slides/slide35.xml><?xml version="1.0" encoding="utf-8"?>
+<file path=ppt/slides/slide36.xml><?xml version="1.0" encoding="utf-8"?>
 <p:sld xmlns:a="http://schemas.openxmlformats.org/drawingml/2006/main" xmlns:r="http://schemas.openxmlformats.org/officeDocument/2006/relationships" xmlns:p="http://schemas.openxmlformats.org/presentationml/2006/main">
   <p:cSld>
     <p:spTree>
@@ -27217,7 +27419,7 @@
 </p:sld>
 </file>
 
-<file path=ppt/slides/slide36.xml><?xml version="1.0" encoding="utf-8"?>
+<file path=ppt/slides/slide37.xml><?xml version="1.0" encoding="utf-8"?>
 <p:sld xmlns:a="http://schemas.openxmlformats.org/drawingml/2006/main" xmlns:r="http://schemas.openxmlformats.org/officeDocument/2006/relationships" xmlns:p="http://schemas.openxmlformats.org/presentationml/2006/main">
   <p:cSld>
     <p:spTree>

</xml_diff>